<commit_message>
updated some files as per the objectives of the project
</commit_message>
<xml_diff>
--- a/bigdatafundamentals/Presentation5.pptx
+++ b/bigdatafundamentals/Presentation5.pptx
@@ -212,7 +212,7 @@
           <a:p>
             <a:fld id="{00C34A7A-E1FA-414D-9580-422F17FC2C32}" type="datetimeFigureOut">
               <a:rPr lang="en-NP" smtClean="0"/>
-              <a:t>12/04/2024</a:t>
+              <a:t>13/04/2024</a:t>
             </a:fld>
             <a:endParaRPr lang="en-NP"/>
           </a:p>
@@ -524,6 +524,90 @@
           <a:bodyPr/>
           <a:lstStyle/>
           <a:p>
+            <a:endParaRPr lang="en-NP"/>
+          </a:p>
+        </p:txBody>
+      </p:sp>
+      <p:sp>
+        <p:nvSpPr>
+          <p:cNvPr id="4" name="Slide Number Placeholder 3"/>
+          <p:cNvSpPr>
+            <a:spLocks noGrp="1"/>
+          </p:cNvSpPr>
+          <p:nvPr>
+            <p:ph type="sldNum" sz="quarter" idx="5"/>
+          </p:nvPr>
+        </p:nvSpPr>
+        <p:spPr/>
+        <p:txBody>
+          <a:bodyPr/>
+          <a:lstStyle/>
+          <a:p>
+            <a:fld id="{23000FB0-6FB3-AD4B-9B14-44125821A656}" type="slidenum">
+              <a:rPr lang="en-NP" smtClean="0"/>
+              <a:t>1</a:t>
+            </a:fld>
+            <a:endParaRPr lang="en-NP"/>
+          </a:p>
+        </p:txBody>
+      </p:sp>
+    </p:spTree>
+    <p:extLst>
+      <p:ext uri="{BB962C8B-B14F-4D97-AF65-F5344CB8AC3E}">
+        <p14:creationId xmlns:p14="http://schemas.microsoft.com/office/powerpoint/2010/main" val="703638673"/>
+      </p:ext>
+    </p:extLst>
+  </p:cSld>
+  <p:clrMapOvr>
+    <a:masterClrMapping/>
+  </p:clrMapOvr>
+</p:notes>
+</file>
+
+<file path=ppt/notesSlides/notesSlide10.xml><?xml version="1.0" encoding="utf-8"?>
+<p:notes xmlns:a="http://schemas.openxmlformats.org/drawingml/2006/main" xmlns:r="http://schemas.openxmlformats.org/officeDocument/2006/relationships" xmlns:p="http://schemas.openxmlformats.org/presentationml/2006/main">
+  <p:cSld>
+    <p:spTree>
+      <p:nvGrpSpPr>
+        <p:cNvPr id="1" name=""/>
+        <p:cNvGrpSpPr/>
+        <p:nvPr/>
+      </p:nvGrpSpPr>
+      <p:grpSpPr>
+        <a:xfrm>
+          <a:off x="0" y="0"/>
+          <a:ext cx="0" cy="0"/>
+          <a:chOff x="0" y="0"/>
+          <a:chExt cx="0" cy="0"/>
+        </a:xfrm>
+      </p:grpSpPr>
+      <p:sp>
+        <p:nvSpPr>
+          <p:cNvPr id="2" name="Slide Image Placeholder 1"/>
+          <p:cNvSpPr>
+            <a:spLocks noGrp="1" noRot="1" noChangeAspect="1"/>
+          </p:cNvSpPr>
+          <p:nvPr>
+            <p:ph type="sldImg"/>
+          </p:nvPr>
+        </p:nvSpPr>
+        <p:spPr/>
+      </p:sp>
+      <p:sp>
+        <p:nvSpPr>
+          <p:cNvPr id="3" name="Notes Placeholder 2"/>
+          <p:cNvSpPr>
+            <a:spLocks noGrp="1"/>
+          </p:cNvSpPr>
+          <p:nvPr>
+            <p:ph type="body" idx="1"/>
+          </p:nvPr>
+        </p:nvSpPr>
+        <p:spPr/>
+        <p:txBody>
+          <a:bodyPr/>
+          <a:lstStyle/>
+          <a:p>
             <a:pPr marL="0" marR="0" lvl="0" indent="0" algn="l" defTabSz="914400" rtl="0" eaLnBrk="1" fontAlgn="auto" latinLnBrk="0" hangingPunct="1">
               <a:lnSpc>
                 <a:spcPct val="100000"/>
@@ -561,39 +645,6 @@
               <a:rPr lang="en-US" dirty="0"/>
               <a:t>/plus/5847-which-canadian-businesses-are-using-generative-artificial-intelligence-and-why</a:t>
             </a:r>
-            <a:br>
-              <a:rPr lang="en-US" dirty="0"/>
-            </a:br>
-            <a:br>
-              <a:rPr lang="en-US" dirty="0"/>
-            </a:br>
-            <a:r>
-              <a:rPr lang="en-US" dirty="0"/>
-              <a:t>Information and cultural industries being the top business sector using Generative AI and getting average highest value of using generative AI across Canada.</a:t>
-            </a:r>
-          </a:p>
-          <a:p>
-            <a:pPr marL="0" marR="0" lvl="0" indent="0" algn="l" defTabSz="914400" rtl="0" eaLnBrk="1" fontAlgn="auto" latinLnBrk="0" hangingPunct="1">
-              <a:lnSpc>
-                <a:spcPct val="100000"/>
-              </a:lnSpc>
-              <a:spcBef>
-                <a:spcPts val="0"/>
-              </a:spcBef>
-              <a:spcAft>
-                <a:spcPts val="0"/>
-              </a:spcAft>
-              <a:buClrTx/>
-              <a:buSzTx/>
-              <a:buFontTx/>
-              <a:buNone/>
-              <a:tabLst/>
-              <a:defRPr/>
-            </a:pPr>
-            <a:r>
-              <a:rPr lang="en-US" dirty="0"/>
-              <a:t>And other similar</a:t>
-            </a:r>
             <a:endParaRPr lang="en-NP" dirty="0"/>
           </a:p>
           <a:p>
@@ -618,7 +669,7 @@
           <a:p>
             <a:fld id="{23000FB0-6FB3-AD4B-9B14-44125821A656}" type="slidenum">
               <a:rPr lang="en-NP" smtClean="0"/>
-              <a:t>9</a:t>
+              <a:t>10</a:t>
             </a:fld>
             <a:endParaRPr lang="en-NP"/>
           </a:p>
@@ -627,7 +678,511 @@
     </p:spTree>
     <p:extLst>
       <p:ext uri="{BB962C8B-B14F-4D97-AF65-F5344CB8AC3E}">
-        <p14:creationId xmlns:p14="http://schemas.microsoft.com/office/powerpoint/2010/main" val="2662994948"/>
+        <p14:creationId xmlns:p14="http://schemas.microsoft.com/office/powerpoint/2010/main" val="3051186125"/>
+      </p:ext>
+    </p:extLst>
+  </p:cSld>
+  <p:clrMapOvr>
+    <a:masterClrMapping/>
+  </p:clrMapOvr>
+</p:notes>
+</file>
+
+<file path=ppt/notesSlides/notesSlide11.xml><?xml version="1.0" encoding="utf-8"?>
+<p:notes xmlns:a="http://schemas.openxmlformats.org/drawingml/2006/main" xmlns:r="http://schemas.openxmlformats.org/officeDocument/2006/relationships" xmlns:p="http://schemas.openxmlformats.org/presentationml/2006/main">
+  <p:cSld>
+    <p:spTree>
+      <p:nvGrpSpPr>
+        <p:cNvPr id="1" name=""/>
+        <p:cNvGrpSpPr/>
+        <p:nvPr/>
+      </p:nvGrpSpPr>
+      <p:grpSpPr>
+        <a:xfrm>
+          <a:off x="0" y="0"/>
+          <a:ext cx="0" cy="0"/>
+          <a:chOff x="0" y="0"/>
+          <a:chExt cx="0" cy="0"/>
+        </a:xfrm>
+      </p:grpSpPr>
+      <p:sp>
+        <p:nvSpPr>
+          <p:cNvPr id="2" name="Slide Image Placeholder 1"/>
+          <p:cNvSpPr>
+            <a:spLocks noGrp="1" noRot="1" noChangeAspect="1"/>
+          </p:cNvSpPr>
+          <p:nvPr>
+            <p:ph type="sldImg"/>
+          </p:nvPr>
+        </p:nvSpPr>
+        <p:spPr/>
+      </p:sp>
+      <p:sp>
+        <p:nvSpPr>
+          <p:cNvPr id="3" name="Notes Placeholder 2"/>
+          <p:cNvSpPr>
+            <a:spLocks noGrp="1"/>
+          </p:cNvSpPr>
+          <p:nvPr>
+            <p:ph type="body" idx="1"/>
+          </p:nvPr>
+        </p:nvSpPr>
+        <p:spPr/>
+        <p:txBody>
+          <a:bodyPr/>
+          <a:lstStyle/>
+          <a:p>
+            <a:endParaRPr lang="en-NP"/>
+          </a:p>
+        </p:txBody>
+      </p:sp>
+      <p:sp>
+        <p:nvSpPr>
+          <p:cNvPr id="4" name="Slide Number Placeholder 3"/>
+          <p:cNvSpPr>
+            <a:spLocks noGrp="1"/>
+          </p:cNvSpPr>
+          <p:nvPr>
+            <p:ph type="sldNum" sz="quarter" idx="5"/>
+          </p:nvPr>
+        </p:nvSpPr>
+        <p:spPr/>
+        <p:txBody>
+          <a:bodyPr/>
+          <a:lstStyle/>
+          <a:p>
+            <a:fld id="{23000FB0-6FB3-AD4B-9B14-44125821A656}" type="slidenum">
+              <a:rPr lang="en-NP" smtClean="0"/>
+              <a:t>11</a:t>
+            </a:fld>
+            <a:endParaRPr lang="en-NP"/>
+          </a:p>
+        </p:txBody>
+      </p:sp>
+    </p:spTree>
+    <p:extLst>
+      <p:ext uri="{BB962C8B-B14F-4D97-AF65-F5344CB8AC3E}">
+        <p14:creationId xmlns:p14="http://schemas.microsoft.com/office/powerpoint/2010/main" val="4225901050"/>
+      </p:ext>
+    </p:extLst>
+  </p:cSld>
+  <p:clrMapOvr>
+    <a:masterClrMapping/>
+  </p:clrMapOvr>
+</p:notes>
+</file>
+
+<file path=ppt/notesSlides/notesSlide12.xml><?xml version="1.0" encoding="utf-8"?>
+<p:notes xmlns:a="http://schemas.openxmlformats.org/drawingml/2006/main" xmlns:r="http://schemas.openxmlformats.org/officeDocument/2006/relationships" xmlns:p="http://schemas.openxmlformats.org/presentationml/2006/main">
+  <p:cSld>
+    <p:spTree>
+      <p:nvGrpSpPr>
+        <p:cNvPr id="1" name=""/>
+        <p:cNvGrpSpPr/>
+        <p:nvPr/>
+      </p:nvGrpSpPr>
+      <p:grpSpPr>
+        <a:xfrm>
+          <a:off x="0" y="0"/>
+          <a:ext cx="0" cy="0"/>
+          <a:chOff x="0" y="0"/>
+          <a:chExt cx="0" cy="0"/>
+        </a:xfrm>
+      </p:grpSpPr>
+      <p:sp>
+        <p:nvSpPr>
+          <p:cNvPr id="2" name="Slide Image Placeholder 1"/>
+          <p:cNvSpPr>
+            <a:spLocks noGrp="1" noRot="1" noChangeAspect="1"/>
+          </p:cNvSpPr>
+          <p:nvPr>
+            <p:ph type="sldImg"/>
+          </p:nvPr>
+        </p:nvSpPr>
+        <p:spPr/>
+      </p:sp>
+      <p:sp>
+        <p:nvSpPr>
+          <p:cNvPr id="3" name="Notes Placeholder 2"/>
+          <p:cNvSpPr>
+            <a:spLocks noGrp="1"/>
+          </p:cNvSpPr>
+          <p:nvPr>
+            <p:ph type="body" idx="1"/>
+          </p:nvPr>
+        </p:nvSpPr>
+        <p:spPr/>
+        <p:txBody>
+          <a:bodyPr/>
+          <a:lstStyle/>
+          <a:p>
+            <a:endParaRPr lang="en-NP"/>
+          </a:p>
+        </p:txBody>
+      </p:sp>
+      <p:sp>
+        <p:nvSpPr>
+          <p:cNvPr id="4" name="Slide Number Placeholder 3"/>
+          <p:cNvSpPr>
+            <a:spLocks noGrp="1"/>
+          </p:cNvSpPr>
+          <p:nvPr>
+            <p:ph type="sldNum" sz="quarter" idx="5"/>
+          </p:nvPr>
+        </p:nvSpPr>
+        <p:spPr/>
+        <p:txBody>
+          <a:bodyPr/>
+          <a:lstStyle/>
+          <a:p>
+            <a:fld id="{23000FB0-6FB3-AD4B-9B14-44125821A656}" type="slidenum">
+              <a:rPr lang="en-NP" smtClean="0"/>
+              <a:t>12</a:t>
+            </a:fld>
+            <a:endParaRPr lang="en-NP"/>
+          </a:p>
+        </p:txBody>
+      </p:sp>
+    </p:spTree>
+    <p:extLst>
+      <p:ext uri="{BB962C8B-B14F-4D97-AF65-F5344CB8AC3E}">
+        <p14:creationId xmlns:p14="http://schemas.microsoft.com/office/powerpoint/2010/main" val="1491276983"/>
+      </p:ext>
+    </p:extLst>
+  </p:cSld>
+  <p:clrMapOvr>
+    <a:masterClrMapping/>
+  </p:clrMapOvr>
+</p:notes>
+</file>
+
+<file path=ppt/notesSlides/notesSlide13.xml><?xml version="1.0" encoding="utf-8"?>
+<p:notes xmlns:a="http://schemas.openxmlformats.org/drawingml/2006/main" xmlns:r="http://schemas.openxmlformats.org/officeDocument/2006/relationships" xmlns:p="http://schemas.openxmlformats.org/presentationml/2006/main">
+  <p:cSld>
+    <p:spTree>
+      <p:nvGrpSpPr>
+        <p:cNvPr id="1" name=""/>
+        <p:cNvGrpSpPr/>
+        <p:nvPr/>
+      </p:nvGrpSpPr>
+      <p:grpSpPr>
+        <a:xfrm>
+          <a:off x="0" y="0"/>
+          <a:ext cx="0" cy="0"/>
+          <a:chOff x="0" y="0"/>
+          <a:chExt cx="0" cy="0"/>
+        </a:xfrm>
+      </p:grpSpPr>
+      <p:sp>
+        <p:nvSpPr>
+          <p:cNvPr id="2" name="Slide Image Placeholder 1"/>
+          <p:cNvSpPr>
+            <a:spLocks noGrp="1" noRot="1" noChangeAspect="1"/>
+          </p:cNvSpPr>
+          <p:nvPr>
+            <p:ph type="sldImg"/>
+          </p:nvPr>
+        </p:nvSpPr>
+        <p:spPr/>
+      </p:sp>
+      <p:sp>
+        <p:nvSpPr>
+          <p:cNvPr id="3" name="Notes Placeholder 2"/>
+          <p:cNvSpPr>
+            <a:spLocks noGrp="1"/>
+          </p:cNvSpPr>
+          <p:nvPr>
+            <p:ph type="body" idx="1"/>
+          </p:nvPr>
+        </p:nvSpPr>
+        <p:spPr/>
+        <p:txBody>
+          <a:bodyPr/>
+          <a:lstStyle/>
+          <a:p>
+            <a:endParaRPr lang="en-NP"/>
+          </a:p>
+        </p:txBody>
+      </p:sp>
+      <p:sp>
+        <p:nvSpPr>
+          <p:cNvPr id="4" name="Slide Number Placeholder 3"/>
+          <p:cNvSpPr>
+            <a:spLocks noGrp="1"/>
+          </p:cNvSpPr>
+          <p:nvPr>
+            <p:ph type="sldNum" sz="quarter" idx="5"/>
+          </p:nvPr>
+        </p:nvSpPr>
+        <p:spPr/>
+        <p:txBody>
+          <a:bodyPr/>
+          <a:lstStyle/>
+          <a:p>
+            <a:fld id="{23000FB0-6FB3-AD4B-9B14-44125821A656}" type="slidenum">
+              <a:rPr lang="en-NP" smtClean="0"/>
+              <a:t>13</a:t>
+            </a:fld>
+            <a:endParaRPr lang="en-NP"/>
+          </a:p>
+        </p:txBody>
+      </p:sp>
+    </p:spTree>
+    <p:extLst>
+      <p:ext uri="{BB962C8B-B14F-4D97-AF65-F5344CB8AC3E}">
+        <p14:creationId xmlns:p14="http://schemas.microsoft.com/office/powerpoint/2010/main" val="4104360816"/>
+      </p:ext>
+    </p:extLst>
+  </p:cSld>
+  <p:clrMapOvr>
+    <a:masterClrMapping/>
+  </p:clrMapOvr>
+</p:notes>
+</file>
+
+<file path=ppt/notesSlides/notesSlide14.xml><?xml version="1.0" encoding="utf-8"?>
+<p:notes xmlns:a="http://schemas.openxmlformats.org/drawingml/2006/main" xmlns:r="http://schemas.openxmlformats.org/officeDocument/2006/relationships" xmlns:p="http://schemas.openxmlformats.org/presentationml/2006/main">
+  <p:cSld>
+    <p:spTree>
+      <p:nvGrpSpPr>
+        <p:cNvPr id="1" name=""/>
+        <p:cNvGrpSpPr/>
+        <p:nvPr/>
+      </p:nvGrpSpPr>
+      <p:grpSpPr>
+        <a:xfrm>
+          <a:off x="0" y="0"/>
+          <a:ext cx="0" cy="0"/>
+          <a:chOff x="0" y="0"/>
+          <a:chExt cx="0" cy="0"/>
+        </a:xfrm>
+      </p:grpSpPr>
+      <p:sp>
+        <p:nvSpPr>
+          <p:cNvPr id="2" name="Slide Image Placeholder 1"/>
+          <p:cNvSpPr>
+            <a:spLocks noGrp="1" noRot="1" noChangeAspect="1"/>
+          </p:cNvSpPr>
+          <p:nvPr>
+            <p:ph type="sldImg"/>
+          </p:nvPr>
+        </p:nvSpPr>
+        <p:spPr/>
+      </p:sp>
+      <p:sp>
+        <p:nvSpPr>
+          <p:cNvPr id="3" name="Notes Placeholder 2"/>
+          <p:cNvSpPr>
+            <a:spLocks noGrp="1"/>
+          </p:cNvSpPr>
+          <p:nvPr>
+            <p:ph type="body" idx="1"/>
+          </p:nvPr>
+        </p:nvSpPr>
+        <p:spPr/>
+        <p:txBody>
+          <a:bodyPr/>
+          <a:lstStyle/>
+          <a:p>
+            <a:endParaRPr lang="en-NP"/>
+          </a:p>
+        </p:txBody>
+      </p:sp>
+      <p:sp>
+        <p:nvSpPr>
+          <p:cNvPr id="4" name="Slide Number Placeholder 3"/>
+          <p:cNvSpPr>
+            <a:spLocks noGrp="1"/>
+          </p:cNvSpPr>
+          <p:nvPr>
+            <p:ph type="sldNum" sz="quarter" idx="5"/>
+          </p:nvPr>
+        </p:nvSpPr>
+        <p:spPr/>
+        <p:txBody>
+          <a:bodyPr/>
+          <a:lstStyle/>
+          <a:p>
+            <a:fld id="{23000FB0-6FB3-AD4B-9B14-44125821A656}" type="slidenum">
+              <a:rPr lang="en-NP" smtClean="0"/>
+              <a:t>14</a:t>
+            </a:fld>
+            <a:endParaRPr lang="en-NP"/>
+          </a:p>
+        </p:txBody>
+      </p:sp>
+    </p:spTree>
+    <p:extLst>
+      <p:ext uri="{BB962C8B-B14F-4D97-AF65-F5344CB8AC3E}">
+        <p14:creationId xmlns:p14="http://schemas.microsoft.com/office/powerpoint/2010/main" val="1618082626"/>
+      </p:ext>
+    </p:extLst>
+  </p:cSld>
+  <p:clrMapOvr>
+    <a:masterClrMapping/>
+  </p:clrMapOvr>
+</p:notes>
+</file>
+
+<file path=ppt/notesSlides/notesSlide15.xml><?xml version="1.0" encoding="utf-8"?>
+<p:notes xmlns:a="http://schemas.openxmlformats.org/drawingml/2006/main" xmlns:r="http://schemas.openxmlformats.org/officeDocument/2006/relationships" xmlns:p="http://schemas.openxmlformats.org/presentationml/2006/main">
+  <p:cSld>
+    <p:spTree>
+      <p:nvGrpSpPr>
+        <p:cNvPr id="1" name=""/>
+        <p:cNvGrpSpPr/>
+        <p:nvPr/>
+      </p:nvGrpSpPr>
+      <p:grpSpPr>
+        <a:xfrm>
+          <a:off x="0" y="0"/>
+          <a:ext cx="0" cy="0"/>
+          <a:chOff x="0" y="0"/>
+          <a:chExt cx="0" cy="0"/>
+        </a:xfrm>
+      </p:grpSpPr>
+      <p:sp>
+        <p:nvSpPr>
+          <p:cNvPr id="2" name="Slide Image Placeholder 1"/>
+          <p:cNvSpPr>
+            <a:spLocks noGrp="1" noRot="1" noChangeAspect="1"/>
+          </p:cNvSpPr>
+          <p:nvPr>
+            <p:ph type="sldImg"/>
+          </p:nvPr>
+        </p:nvSpPr>
+        <p:spPr/>
+      </p:sp>
+      <p:sp>
+        <p:nvSpPr>
+          <p:cNvPr id="3" name="Notes Placeholder 2"/>
+          <p:cNvSpPr>
+            <a:spLocks noGrp="1"/>
+          </p:cNvSpPr>
+          <p:nvPr>
+            <p:ph type="body" idx="1"/>
+          </p:nvPr>
+        </p:nvSpPr>
+        <p:spPr/>
+        <p:txBody>
+          <a:bodyPr/>
+          <a:lstStyle/>
+          <a:p>
+            <a:endParaRPr lang="en-NP"/>
+          </a:p>
+        </p:txBody>
+      </p:sp>
+      <p:sp>
+        <p:nvSpPr>
+          <p:cNvPr id="4" name="Slide Number Placeholder 3"/>
+          <p:cNvSpPr>
+            <a:spLocks noGrp="1"/>
+          </p:cNvSpPr>
+          <p:nvPr>
+            <p:ph type="sldNum" sz="quarter" idx="5"/>
+          </p:nvPr>
+        </p:nvSpPr>
+        <p:spPr/>
+        <p:txBody>
+          <a:bodyPr/>
+          <a:lstStyle/>
+          <a:p>
+            <a:fld id="{23000FB0-6FB3-AD4B-9B14-44125821A656}" type="slidenum">
+              <a:rPr lang="en-NP" smtClean="0"/>
+              <a:t>15</a:t>
+            </a:fld>
+            <a:endParaRPr lang="en-NP"/>
+          </a:p>
+        </p:txBody>
+      </p:sp>
+    </p:spTree>
+    <p:extLst>
+      <p:ext uri="{BB962C8B-B14F-4D97-AF65-F5344CB8AC3E}">
+        <p14:creationId xmlns:p14="http://schemas.microsoft.com/office/powerpoint/2010/main" val="3141980281"/>
+      </p:ext>
+    </p:extLst>
+  </p:cSld>
+  <p:clrMapOvr>
+    <a:masterClrMapping/>
+  </p:clrMapOvr>
+</p:notes>
+</file>
+
+<file path=ppt/notesSlides/notesSlide16.xml><?xml version="1.0" encoding="utf-8"?>
+<p:notes xmlns:a="http://schemas.openxmlformats.org/drawingml/2006/main" xmlns:r="http://schemas.openxmlformats.org/officeDocument/2006/relationships" xmlns:p="http://schemas.openxmlformats.org/presentationml/2006/main">
+  <p:cSld>
+    <p:spTree>
+      <p:nvGrpSpPr>
+        <p:cNvPr id="1" name=""/>
+        <p:cNvGrpSpPr/>
+        <p:nvPr/>
+      </p:nvGrpSpPr>
+      <p:grpSpPr>
+        <a:xfrm>
+          <a:off x="0" y="0"/>
+          <a:ext cx="0" cy="0"/>
+          <a:chOff x="0" y="0"/>
+          <a:chExt cx="0" cy="0"/>
+        </a:xfrm>
+      </p:grpSpPr>
+      <p:sp>
+        <p:nvSpPr>
+          <p:cNvPr id="2" name="Slide Image Placeholder 1"/>
+          <p:cNvSpPr>
+            <a:spLocks noGrp="1" noRot="1" noChangeAspect="1"/>
+          </p:cNvSpPr>
+          <p:nvPr>
+            <p:ph type="sldImg"/>
+          </p:nvPr>
+        </p:nvSpPr>
+        <p:spPr/>
+      </p:sp>
+      <p:sp>
+        <p:nvSpPr>
+          <p:cNvPr id="3" name="Notes Placeholder 2"/>
+          <p:cNvSpPr>
+            <a:spLocks noGrp="1"/>
+          </p:cNvSpPr>
+          <p:nvPr>
+            <p:ph type="body" idx="1"/>
+          </p:nvPr>
+        </p:nvSpPr>
+        <p:spPr/>
+        <p:txBody>
+          <a:bodyPr/>
+          <a:lstStyle/>
+          <a:p>
+            <a:endParaRPr lang="en-NP"/>
+          </a:p>
+        </p:txBody>
+      </p:sp>
+      <p:sp>
+        <p:nvSpPr>
+          <p:cNvPr id="4" name="Slide Number Placeholder 3"/>
+          <p:cNvSpPr>
+            <a:spLocks noGrp="1"/>
+          </p:cNvSpPr>
+          <p:nvPr>
+            <p:ph type="sldNum" sz="quarter" idx="5"/>
+          </p:nvPr>
+        </p:nvSpPr>
+        <p:spPr/>
+        <p:txBody>
+          <a:bodyPr/>
+          <a:lstStyle/>
+          <a:p>
+            <a:fld id="{23000FB0-6FB3-AD4B-9B14-44125821A656}" type="slidenum">
+              <a:rPr lang="en-NP" smtClean="0"/>
+              <a:t>16</a:t>
+            </a:fld>
+            <a:endParaRPr lang="en-NP"/>
+          </a:p>
+        </p:txBody>
+      </p:sp>
+    </p:spTree>
+    <p:extLst>
+      <p:ext uri="{BB962C8B-B14F-4D97-AF65-F5344CB8AC3E}">
+        <p14:creationId xmlns:p14="http://schemas.microsoft.com/office/powerpoint/2010/main" val="2140819493"/>
       </p:ext>
     </p:extLst>
   </p:cSld>
@@ -681,6 +1236,594 @@
           <a:bodyPr/>
           <a:lstStyle/>
           <a:p>
+            <a:endParaRPr lang="en-NP"/>
+          </a:p>
+        </p:txBody>
+      </p:sp>
+      <p:sp>
+        <p:nvSpPr>
+          <p:cNvPr id="4" name="Slide Number Placeholder 3"/>
+          <p:cNvSpPr>
+            <a:spLocks noGrp="1"/>
+          </p:cNvSpPr>
+          <p:nvPr>
+            <p:ph type="sldNum" sz="quarter" idx="5"/>
+          </p:nvPr>
+        </p:nvSpPr>
+        <p:spPr/>
+        <p:txBody>
+          <a:bodyPr/>
+          <a:lstStyle/>
+          <a:p>
+            <a:fld id="{23000FB0-6FB3-AD4B-9B14-44125821A656}" type="slidenum">
+              <a:rPr lang="en-NP" smtClean="0"/>
+              <a:t>2</a:t>
+            </a:fld>
+            <a:endParaRPr lang="en-NP"/>
+          </a:p>
+        </p:txBody>
+      </p:sp>
+    </p:spTree>
+    <p:extLst>
+      <p:ext uri="{BB962C8B-B14F-4D97-AF65-F5344CB8AC3E}">
+        <p14:creationId xmlns:p14="http://schemas.microsoft.com/office/powerpoint/2010/main" val="44470781"/>
+      </p:ext>
+    </p:extLst>
+  </p:cSld>
+  <p:clrMapOvr>
+    <a:masterClrMapping/>
+  </p:clrMapOvr>
+</p:notes>
+</file>
+
+<file path=ppt/notesSlides/notesSlide3.xml><?xml version="1.0" encoding="utf-8"?>
+<p:notes xmlns:a="http://schemas.openxmlformats.org/drawingml/2006/main" xmlns:r="http://schemas.openxmlformats.org/officeDocument/2006/relationships" xmlns:p="http://schemas.openxmlformats.org/presentationml/2006/main">
+  <p:cSld>
+    <p:spTree>
+      <p:nvGrpSpPr>
+        <p:cNvPr id="1" name=""/>
+        <p:cNvGrpSpPr/>
+        <p:nvPr/>
+      </p:nvGrpSpPr>
+      <p:grpSpPr>
+        <a:xfrm>
+          <a:off x="0" y="0"/>
+          <a:ext cx="0" cy="0"/>
+          <a:chOff x="0" y="0"/>
+          <a:chExt cx="0" cy="0"/>
+        </a:xfrm>
+      </p:grpSpPr>
+      <p:sp>
+        <p:nvSpPr>
+          <p:cNvPr id="2" name="Slide Image Placeholder 1"/>
+          <p:cNvSpPr>
+            <a:spLocks noGrp="1" noRot="1" noChangeAspect="1"/>
+          </p:cNvSpPr>
+          <p:nvPr>
+            <p:ph type="sldImg"/>
+          </p:nvPr>
+        </p:nvSpPr>
+        <p:spPr/>
+      </p:sp>
+      <p:sp>
+        <p:nvSpPr>
+          <p:cNvPr id="3" name="Notes Placeholder 2"/>
+          <p:cNvSpPr>
+            <a:spLocks noGrp="1"/>
+          </p:cNvSpPr>
+          <p:nvPr>
+            <p:ph type="body" idx="1"/>
+          </p:nvPr>
+        </p:nvSpPr>
+        <p:spPr/>
+        <p:txBody>
+          <a:bodyPr/>
+          <a:lstStyle/>
+          <a:p>
+            <a:endParaRPr lang="en-NP"/>
+          </a:p>
+        </p:txBody>
+      </p:sp>
+      <p:sp>
+        <p:nvSpPr>
+          <p:cNvPr id="4" name="Slide Number Placeholder 3"/>
+          <p:cNvSpPr>
+            <a:spLocks noGrp="1"/>
+          </p:cNvSpPr>
+          <p:nvPr>
+            <p:ph type="sldNum" sz="quarter" idx="5"/>
+          </p:nvPr>
+        </p:nvSpPr>
+        <p:spPr/>
+        <p:txBody>
+          <a:bodyPr/>
+          <a:lstStyle/>
+          <a:p>
+            <a:fld id="{23000FB0-6FB3-AD4B-9B14-44125821A656}" type="slidenum">
+              <a:rPr lang="en-NP" smtClean="0"/>
+              <a:t>3</a:t>
+            </a:fld>
+            <a:endParaRPr lang="en-NP"/>
+          </a:p>
+        </p:txBody>
+      </p:sp>
+    </p:spTree>
+    <p:extLst>
+      <p:ext uri="{BB962C8B-B14F-4D97-AF65-F5344CB8AC3E}">
+        <p14:creationId xmlns:p14="http://schemas.microsoft.com/office/powerpoint/2010/main" val="2361198127"/>
+      </p:ext>
+    </p:extLst>
+  </p:cSld>
+  <p:clrMapOvr>
+    <a:masterClrMapping/>
+  </p:clrMapOvr>
+</p:notes>
+</file>
+
+<file path=ppt/notesSlides/notesSlide4.xml><?xml version="1.0" encoding="utf-8"?>
+<p:notes xmlns:a="http://schemas.openxmlformats.org/drawingml/2006/main" xmlns:r="http://schemas.openxmlformats.org/officeDocument/2006/relationships" xmlns:p="http://schemas.openxmlformats.org/presentationml/2006/main">
+  <p:cSld>
+    <p:spTree>
+      <p:nvGrpSpPr>
+        <p:cNvPr id="1" name=""/>
+        <p:cNvGrpSpPr/>
+        <p:nvPr/>
+      </p:nvGrpSpPr>
+      <p:grpSpPr>
+        <a:xfrm>
+          <a:off x="0" y="0"/>
+          <a:ext cx="0" cy="0"/>
+          <a:chOff x="0" y="0"/>
+          <a:chExt cx="0" cy="0"/>
+        </a:xfrm>
+      </p:grpSpPr>
+      <p:sp>
+        <p:nvSpPr>
+          <p:cNvPr id="2" name="Slide Image Placeholder 1"/>
+          <p:cNvSpPr>
+            <a:spLocks noGrp="1" noRot="1" noChangeAspect="1"/>
+          </p:cNvSpPr>
+          <p:nvPr>
+            <p:ph type="sldImg"/>
+          </p:nvPr>
+        </p:nvSpPr>
+        <p:spPr/>
+      </p:sp>
+      <p:sp>
+        <p:nvSpPr>
+          <p:cNvPr id="3" name="Notes Placeholder 2"/>
+          <p:cNvSpPr>
+            <a:spLocks noGrp="1"/>
+          </p:cNvSpPr>
+          <p:nvPr>
+            <p:ph type="body" idx="1"/>
+          </p:nvPr>
+        </p:nvSpPr>
+        <p:spPr/>
+        <p:txBody>
+          <a:bodyPr/>
+          <a:lstStyle/>
+          <a:p>
+            <a:endParaRPr lang="en-NP"/>
+          </a:p>
+        </p:txBody>
+      </p:sp>
+      <p:sp>
+        <p:nvSpPr>
+          <p:cNvPr id="4" name="Slide Number Placeholder 3"/>
+          <p:cNvSpPr>
+            <a:spLocks noGrp="1"/>
+          </p:cNvSpPr>
+          <p:nvPr>
+            <p:ph type="sldNum" sz="quarter" idx="5"/>
+          </p:nvPr>
+        </p:nvSpPr>
+        <p:spPr/>
+        <p:txBody>
+          <a:bodyPr/>
+          <a:lstStyle/>
+          <a:p>
+            <a:fld id="{23000FB0-6FB3-AD4B-9B14-44125821A656}" type="slidenum">
+              <a:rPr lang="en-NP" smtClean="0"/>
+              <a:t>4</a:t>
+            </a:fld>
+            <a:endParaRPr lang="en-NP"/>
+          </a:p>
+        </p:txBody>
+      </p:sp>
+    </p:spTree>
+    <p:extLst>
+      <p:ext uri="{BB962C8B-B14F-4D97-AF65-F5344CB8AC3E}">
+        <p14:creationId xmlns:p14="http://schemas.microsoft.com/office/powerpoint/2010/main" val="3372737974"/>
+      </p:ext>
+    </p:extLst>
+  </p:cSld>
+  <p:clrMapOvr>
+    <a:masterClrMapping/>
+  </p:clrMapOvr>
+</p:notes>
+</file>
+
+<file path=ppt/notesSlides/notesSlide5.xml><?xml version="1.0" encoding="utf-8"?>
+<p:notes xmlns:a="http://schemas.openxmlformats.org/drawingml/2006/main" xmlns:r="http://schemas.openxmlformats.org/officeDocument/2006/relationships" xmlns:p="http://schemas.openxmlformats.org/presentationml/2006/main">
+  <p:cSld>
+    <p:spTree>
+      <p:nvGrpSpPr>
+        <p:cNvPr id="1" name=""/>
+        <p:cNvGrpSpPr/>
+        <p:nvPr/>
+      </p:nvGrpSpPr>
+      <p:grpSpPr>
+        <a:xfrm>
+          <a:off x="0" y="0"/>
+          <a:ext cx="0" cy="0"/>
+          <a:chOff x="0" y="0"/>
+          <a:chExt cx="0" cy="0"/>
+        </a:xfrm>
+      </p:grpSpPr>
+      <p:sp>
+        <p:nvSpPr>
+          <p:cNvPr id="2" name="Slide Image Placeholder 1"/>
+          <p:cNvSpPr>
+            <a:spLocks noGrp="1" noRot="1" noChangeAspect="1"/>
+          </p:cNvSpPr>
+          <p:nvPr>
+            <p:ph type="sldImg"/>
+          </p:nvPr>
+        </p:nvSpPr>
+        <p:spPr/>
+      </p:sp>
+      <p:sp>
+        <p:nvSpPr>
+          <p:cNvPr id="3" name="Notes Placeholder 2"/>
+          <p:cNvSpPr>
+            <a:spLocks noGrp="1"/>
+          </p:cNvSpPr>
+          <p:nvPr>
+            <p:ph type="body" idx="1"/>
+          </p:nvPr>
+        </p:nvSpPr>
+        <p:spPr/>
+        <p:txBody>
+          <a:bodyPr/>
+          <a:lstStyle/>
+          <a:p>
+            <a:endParaRPr lang="en-NP"/>
+          </a:p>
+        </p:txBody>
+      </p:sp>
+      <p:sp>
+        <p:nvSpPr>
+          <p:cNvPr id="4" name="Slide Number Placeholder 3"/>
+          <p:cNvSpPr>
+            <a:spLocks noGrp="1"/>
+          </p:cNvSpPr>
+          <p:nvPr>
+            <p:ph type="sldNum" sz="quarter" idx="5"/>
+          </p:nvPr>
+        </p:nvSpPr>
+        <p:spPr/>
+        <p:txBody>
+          <a:bodyPr/>
+          <a:lstStyle/>
+          <a:p>
+            <a:fld id="{23000FB0-6FB3-AD4B-9B14-44125821A656}" type="slidenum">
+              <a:rPr lang="en-NP" smtClean="0"/>
+              <a:t>5</a:t>
+            </a:fld>
+            <a:endParaRPr lang="en-NP"/>
+          </a:p>
+        </p:txBody>
+      </p:sp>
+    </p:spTree>
+    <p:extLst>
+      <p:ext uri="{BB962C8B-B14F-4D97-AF65-F5344CB8AC3E}">
+        <p14:creationId xmlns:p14="http://schemas.microsoft.com/office/powerpoint/2010/main" val="523584824"/>
+      </p:ext>
+    </p:extLst>
+  </p:cSld>
+  <p:clrMapOvr>
+    <a:masterClrMapping/>
+  </p:clrMapOvr>
+</p:notes>
+</file>
+
+<file path=ppt/notesSlides/notesSlide6.xml><?xml version="1.0" encoding="utf-8"?>
+<p:notes xmlns:a="http://schemas.openxmlformats.org/drawingml/2006/main" xmlns:r="http://schemas.openxmlformats.org/officeDocument/2006/relationships" xmlns:p="http://schemas.openxmlformats.org/presentationml/2006/main">
+  <p:cSld>
+    <p:spTree>
+      <p:nvGrpSpPr>
+        <p:cNvPr id="1" name=""/>
+        <p:cNvGrpSpPr/>
+        <p:nvPr/>
+      </p:nvGrpSpPr>
+      <p:grpSpPr>
+        <a:xfrm>
+          <a:off x="0" y="0"/>
+          <a:ext cx="0" cy="0"/>
+          <a:chOff x="0" y="0"/>
+          <a:chExt cx="0" cy="0"/>
+        </a:xfrm>
+      </p:grpSpPr>
+      <p:sp>
+        <p:nvSpPr>
+          <p:cNvPr id="2" name="Slide Image Placeholder 1"/>
+          <p:cNvSpPr>
+            <a:spLocks noGrp="1" noRot="1" noChangeAspect="1"/>
+          </p:cNvSpPr>
+          <p:nvPr>
+            <p:ph type="sldImg"/>
+          </p:nvPr>
+        </p:nvSpPr>
+        <p:spPr/>
+      </p:sp>
+      <p:sp>
+        <p:nvSpPr>
+          <p:cNvPr id="3" name="Notes Placeholder 2"/>
+          <p:cNvSpPr>
+            <a:spLocks noGrp="1"/>
+          </p:cNvSpPr>
+          <p:nvPr>
+            <p:ph type="body" idx="1"/>
+          </p:nvPr>
+        </p:nvSpPr>
+        <p:spPr/>
+        <p:txBody>
+          <a:bodyPr/>
+          <a:lstStyle/>
+          <a:p>
+            <a:endParaRPr lang="en-NP"/>
+          </a:p>
+        </p:txBody>
+      </p:sp>
+      <p:sp>
+        <p:nvSpPr>
+          <p:cNvPr id="4" name="Slide Number Placeholder 3"/>
+          <p:cNvSpPr>
+            <a:spLocks noGrp="1"/>
+          </p:cNvSpPr>
+          <p:nvPr>
+            <p:ph type="sldNum" sz="quarter" idx="5"/>
+          </p:nvPr>
+        </p:nvSpPr>
+        <p:spPr/>
+        <p:txBody>
+          <a:bodyPr/>
+          <a:lstStyle/>
+          <a:p>
+            <a:fld id="{23000FB0-6FB3-AD4B-9B14-44125821A656}" type="slidenum">
+              <a:rPr lang="en-NP" smtClean="0"/>
+              <a:t>6</a:t>
+            </a:fld>
+            <a:endParaRPr lang="en-NP"/>
+          </a:p>
+        </p:txBody>
+      </p:sp>
+    </p:spTree>
+    <p:extLst>
+      <p:ext uri="{BB962C8B-B14F-4D97-AF65-F5344CB8AC3E}">
+        <p14:creationId xmlns:p14="http://schemas.microsoft.com/office/powerpoint/2010/main" val="1536122129"/>
+      </p:ext>
+    </p:extLst>
+  </p:cSld>
+  <p:clrMapOvr>
+    <a:masterClrMapping/>
+  </p:clrMapOvr>
+</p:notes>
+</file>
+
+<file path=ppt/notesSlides/notesSlide7.xml><?xml version="1.0" encoding="utf-8"?>
+<p:notes xmlns:a="http://schemas.openxmlformats.org/drawingml/2006/main" xmlns:r="http://schemas.openxmlformats.org/officeDocument/2006/relationships" xmlns:p="http://schemas.openxmlformats.org/presentationml/2006/main">
+  <p:cSld>
+    <p:spTree>
+      <p:nvGrpSpPr>
+        <p:cNvPr id="1" name=""/>
+        <p:cNvGrpSpPr/>
+        <p:nvPr/>
+      </p:nvGrpSpPr>
+      <p:grpSpPr>
+        <a:xfrm>
+          <a:off x="0" y="0"/>
+          <a:ext cx="0" cy="0"/>
+          <a:chOff x="0" y="0"/>
+          <a:chExt cx="0" cy="0"/>
+        </a:xfrm>
+      </p:grpSpPr>
+      <p:sp>
+        <p:nvSpPr>
+          <p:cNvPr id="2" name="Slide Image Placeholder 1"/>
+          <p:cNvSpPr>
+            <a:spLocks noGrp="1" noRot="1" noChangeAspect="1"/>
+          </p:cNvSpPr>
+          <p:nvPr>
+            <p:ph type="sldImg"/>
+          </p:nvPr>
+        </p:nvSpPr>
+        <p:spPr/>
+      </p:sp>
+      <p:sp>
+        <p:nvSpPr>
+          <p:cNvPr id="3" name="Notes Placeholder 2"/>
+          <p:cNvSpPr>
+            <a:spLocks noGrp="1"/>
+          </p:cNvSpPr>
+          <p:nvPr>
+            <p:ph type="body" idx="1"/>
+          </p:nvPr>
+        </p:nvSpPr>
+        <p:spPr/>
+        <p:txBody>
+          <a:bodyPr/>
+          <a:lstStyle/>
+          <a:p>
+            <a:endParaRPr lang="en-NP"/>
+          </a:p>
+        </p:txBody>
+      </p:sp>
+      <p:sp>
+        <p:nvSpPr>
+          <p:cNvPr id="4" name="Slide Number Placeholder 3"/>
+          <p:cNvSpPr>
+            <a:spLocks noGrp="1"/>
+          </p:cNvSpPr>
+          <p:nvPr>
+            <p:ph type="sldNum" sz="quarter" idx="5"/>
+          </p:nvPr>
+        </p:nvSpPr>
+        <p:spPr/>
+        <p:txBody>
+          <a:bodyPr/>
+          <a:lstStyle/>
+          <a:p>
+            <a:fld id="{23000FB0-6FB3-AD4B-9B14-44125821A656}" type="slidenum">
+              <a:rPr lang="en-NP" smtClean="0"/>
+              <a:t>7</a:t>
+            </a:fld>
+            <a:endParaRPr lang="en-NP"/>
+          </a:p>
+        </p:txBody>
+      </p:sp>
+    </p:spTree>
+    <p:extLst>
+      <p:ext uri="{BB962C8B-B14F-4D97-AF65-F5344CB8AC3E}">
+        <p14:creationId xmlns:p14="http://schemas.microsoft.com/office/powerpoint/2010/main" val="1577925761"/>
+      </p:ext>
+    </p:extLst>
+  </p:cSld>
+  <p:clrMapOvr>
+    <a:masterClrMapping/>
+  </p:clrMapOvr>
+</p:notes>
+</file>
+
+<file path=ppt/notesSlides/notesSlide8.xml><?xml version="1.0" encoding="utf-8"?>
+<p:notes xmlns:a="http://schemas.openxmlformats.org/drawingml/2006/main" xmlns:r="http://schemas.openxmlformats.org/officeDocument/2006/relationships" xmlns:p="http://schemas.openxmlformats.org/presentationml/2006/main">
+  <p:cSld>
+    <p:spTree>
+      <p:nvGrpSpPr>
+        <p:cNvPr id="1" name=""/>
+        <p:cNvGrpSpPr/>
+        <p:nvPr/>
+      </p:nvGrpSpPr>
+      <p:grpSpPr>
+        <a:xfrm>
+          <a:off x="0" y="0"/>
+          <a:ext cx="0" cy="0"/>
+          <a:chOff x="0" y="0"/>
+          <a:chExt cx="0" cy="0"/>
+        </a:xfrm>
+      </p:grpSpPr>
+      <p:sp>
+        <p:nvSpPr>
+          <p:cNvPr id="2" name="Slide Image Placeholder 1"/>
+          <p:cNvSpPr>
+            <a:spLocks noGrp="1" noRot="1" noChangeAspect="1"/>
+          </p:cNvSpPr>
+          <p:nvPr>
+            <p:ph type="sldImg"/>
+          </p:nvPr>
+        </p:nvSpPr>
+        <p:spPr/>
+      </p:sp>
+      <p:sp>
+        <p:nvSpPr>
+          <p:cNvPr id="3" name="Notes Placeholder 2"/>
+          <p:cNvSpPr>
+            <a:spLocks noGrp="1"/>
+          </p:cNvSpPr>
+          <p:nvPr>
+            <p:ph type="body" idx="1"/>
+          </p:nvPr>
+        </p:nvSpPr>
+        <p:spPr/>
+        <p:txBody>
+          <a:bodyPr/>
+          <a:lstStyle/>
+          <a:p>
+            <a:endParaRPr lang="en-NP"/>
+          </a:p>
+        </p:txBody>
+      </p:sp>
+      <p:sp>
+        <p:nvSpPr>
+          <p:cNvPr id="4" name="Slide Number Placeholder 3"/>
+          <p:cNvSpPr>
+            <a:spLocks noGrp="1"/>
+          </p:cNvSpPr>
+          <p:nvPr>
+            <p:ph type="sldNum" sz="quarter" idx="5"/>
+          </p:nvPr>
+        </p:nvSpPr>
+        <p:spPr/>
+        <p:txBody>
+          <a:bodyPr/>
+          <a:lstStyle/>
+          <a:p>
+            <a:fld id="{23000FB0-6FB3-AD4B-9B14-44125821A656}" type="slidenum">
+              <a:rPr lang="en-NP" smtClean="0"/>
+              <a:t>8</a:t>
+            </a:fld>
+            <a:endParaRPr lang="en-NP"/>
+          </a:p>
+        </p:txBody>
+      </p:sp>
+    </p:spTree>
+    <p:extLst>
+      <p:ext uri="{BB962C8B-B14F-4D97-AF65-F5344CB8AC3E}">
+        <p14:creationId xmlns:p14="http://schemas.microsoft.com/office/powerpoint/2010/main" val="1933365678"/>
+      </p:ext>
+    </p:extLst>
+  </p:cSld>
+  <p:clrMapOvr>
+    <a:masterClrMapping/>
+  </p:clrMapOvr>
+</p:notes>
+</file>
+
+<file path=ppt/notesSlides/notesSlide9.xml><?xml version="1.0" encoding="utf-8"?>
+<p:notes xmlns:a="http://schemas.openxmlformats.org/drawingml/2006/main" xmlns:r="http://schemas.openxmlformats.org/officeDocument/2006/relationships" xmlns:p="http://schemas.openxmlformats.org/presentationml/2006/main">
+  <p:cSld>
+    <p:spTree>
+      <p:nvGrpSpPr>
+        <p:cNvPr id="1" name=""/>
+        <p:cNvGrpSpPr/>
+        <p:nvPr/>
+      </p:nvGrpSpPr>
+      <p:grpSpPr>
+        <a:xfrm>
+          <a:off x="0" y="0"/>
+          <a:ext cx="0" cy="0"/>
+          <a:chOff x="0" y="0"/>
+          <a:chExt cx="0" cy="0"/>
+        </a:xfrm>
+      </p:grpSpPr>
+      <p:sp>
+        <p:nvSpPr>
+          <p:cNvPr id="2" name="Slide Image Placeholder 1"/>
+          <p:cNvSpPr>
+            <a:spLocks noGrp="1" noRot="1" noChangeAspect="1"/>
+          </p:cNvSpPr>
+          <p:nvPr>
+            <p:ph type="sldImg"/>
+          </p:nvPr>
+        </p:nvSpPr>
+        <p:spPr/>
+      </p:sp>
+      <p:sp>
+        <p:nvSpPr>
+          <p:cNvPr id="3" name="Notes Placeholder 2"/>
+          <p:cNvSpPr>
+            <a:spLocks noGrp="1"/>
+          </p:cNvSpPr>
+          <p:nvPr>
+            <p:ph type="body" idx="1"/>
+          </p:nvPr>
+        </p:nvSpPr>
+        <p:spPr/>
+        <p:txBody>
+          <a:bodyPr/>
+          <a:lstStyle/>
+          <a:p>
             <a:pPr marL="0" marR="0" lvl="0" indent="0" algn="l" defTabSz="914400" rtl="0" eaLnBrk="1" fontAlgn="auto" latinLnBrk="0" hangingPunct="1">
               <a:lnSpc>
                 <a:spcPct val="100000"/>
@@ -718,6 +1861,39 @@
               <a:rPr lang="en-US" dirty="0"/>
               <a:t>/plus/5847-which-canadian-businesses-are-using-generative-artificial-intelligence-and-why</a:t>
             </a:r>
+            <a:br>
+              <a:rPr lang="en-US" dirty="0"/>
+            </a:br>
+            <a:br>
+              <a:rPr lang="en-US" dirty="0"/>
+            </a:br>
+            <a:r>
+              <a:rPr lang="en-US" dirty="0"/>
+              <a:t>Information and cultural industries being the top business sector using Generative AI and getting average highest value of using generative AI across Canada.</a:t>
+            </a:r>
+          </a:p>
+          <a:p>
+            <a:pPr marL="0" marR="0" lvl="0" indent="0" algn="l" defTabSz="914400" rtl="0" eaLnBrk="1" fontAlgn="auto" latinLnBrk="0" hangingPunct="1">
+              <a:lnSpc>
+                <a:spcPct val="100000"/>
+              </a:lnSpc>
+              <a:spcBef>
+                <a:spcPts val="0"/>
+              </a:spcBef>
+              <a:spcAft>
+                <a:spcPts val="0"/>
+              </a:spcAft>
+              <a:buClrTx/>
+              <a:buSzTx/>
+              <a:buFontTx/>
+              <a:buNone/>
+              <a:tabLst/>
+              <a:defRPr/>
+            </a:pPr>
+            <a:r>
+              <a:rPr lang="en-US" dirty="0"/>
+              <a:t>And other similar</a:t>
+            </a:r>
             <a:endParaRPr lang="en-NP" dirty="0"/>
           </a:p>
           <a:p>
@@ -742,7 +1918,7 @@
           <a:p>
             <a:fld id="{23000FB0-6FB3-AD4B-9B14-44125821A656}" type="slidenum">
               <a:rPr lang="en-NP" smtClean="0"/>
-              <a:t>10</a:t>
+              <a:t>9</a:t>
             </a:fld>
             <a:endParaRPr lang="en-NP"/>
           </a:p>
@@ -751,7 +1927,7 @@
     </p:spTree>
     <p:extLst>
       <p:ext uri="{BB962C8B-B14F-4D97-AF65-F5344CB8AC3E}">
-        <p14:creationId xmlns:p14="http://schemas.microsoft.com/office/powerpoint/2010/main" val="3051186125"/>
+        <p14:creationId xmlns:p14="http://schemas.microsoft.com/office/powerpoint/2010/main" val="2662994948"/>
       </p:ext>
     </p:extLst>
   </p:cSld>
@@ -910,7 +2086,7 @@
           <a:p>
             <a:fld id="{A4BF3450-BA41-5048-8667-1F61E2E0538F}" type="datetimeFigureOut">
               <a:rPr lang="en-NP" smtClean="0"/>
-              <a:t>12/04/2024</a:t>
+              <a:t>13/04/2024</a:t>
             </a:fld>
             <a:endParaRPr lang="en-NP"/>
           </a:p>
@@ -1110,7 +2286,7 @@
           <a:p>
             <a:fld id="{A4BF3450-BA41-5048-8667-1F61E2E0538F}" type="datetimeFigureOut">
               <a:rPr lang="en-NP" smtClean="0"/>
-              <a:t>12/04/2024</a:t>
+              <a:t>13/04/2024</a:t>
             </a:fld>
             <a:endParaRPr lang="en-NP"/>
           </a:p>
@@ -1320,7 +2496,7 @@
           <a:p>
             <a:fld id="{A4BF3450-BA41-5048-8667-1F61E2E0538F}" type="datetimeFigureOut">
               <a:rPr lang="en-NP" smtClean="0"/>
-              <a:t>12/04/2024</a:t>
+              <a:t>13/04/2024</a:t>
             </a:fld>
             <a:endParaRPr lang="en-NP"/>
           </a:p>
@@ -1520,7 +2696,7 @@
           <a:p>
             <a:fld id="{A4BF3450-BA41-5048-8667-1F61E2E0538F}" type="datetimeFigureOut">
               <a:rPr lang="en-NP" smtClean="0"/>
-              <a:t>12/04/2024</a:t>
+              <a:t>13/04/2024</a:t>
             </a:fld>
             <a:endParaRPr lang="en-NP"/>
           </a:p>
@@ -1796,7 +2972,7 @@
           <a:p>
             <a:fld id="{A4BF3450-BA41-5048-8667-1F61E2E0538F}" type="datetimeFigureOut">
               <a:rPr lang="en-NP" smtClean="0"/>
-              <a:t>12/04/2024</a:t>
+              <a:t>13/04/2024</a:t>
             </a:fld>
             <a:endParaRPr lang="en-NP"/>
           </a:p>
@@ -2064,7 +3240,7 @@
           <a:p>
             <a:fld id="{A4BF3450-BA41-5048-8667-1F61E2E0538F}" type="datetimeFigureOut">
               <a:rPr lang="en-NP" smtClean="0"/>
-              <a:t>12/04/2024</a:t>
+              <a:t>13/04/2024</a:t>
             </a:fld>
             <a:endParaRPr lang="en-NP"/>
           </a:p>
@@ -2479,7 +3655,7 @@
           <a:p>
             <a:fld id="{A4BF3450-BA41-5048-8667-1F61E2E0538F}" type="datetimeFigureOut">
               <a:rPr lang="en-NP" smtClean="0"/>
-              <a:t>12/04/2024</a:t>
+              <a:t>13/04/2024</a:t>
             </a:fld>
             <a:endParaRPr lang="en-NP"/>
           </a:p>
@@ -2621,7 +3797,7 @@
           <a:p>
             <a:fld id="{A4BF3450-BA41-5048-8667-1F61E2E0538F}" type="datetimeFigureOut">
               <a:rPr lang="en-NP" smtClean="0"/>
-              <a:t>12/04/2024</a:t>
+              <a:t>13/04/2024</a:t>
             </a:fld>
             <a:endParaRPr lang="en-NP"/>
           </a:p>
@@ -2734,7 +3910,7 @@
           <a:p>
             <a:fld id="{A4BF3450-BA41-5048-8667-1F61E2E0538F}" type="datetimeFigureOut">
               <a:rPr lang="en-NP" smtClean="0"/>
-              <a:t>12/04/2024</a:t>
+              <a:t>13/04/2024</a:t>
             </a:fld>
             <a:endParaRPr lang="en-NP"/>
           </a:p>
@@ -3047,7 +4223,7 @@
           <a:p>
             <a:fld id="{A4BF3450-BA41-5048-8667-1F61E2E0538F}" type="datetimeFigureOut">
               <a:rPr lang="en-NP" smtClean="0"/>
-              <a:t>12/04/2024</a:t>
+              <a:t>13/04/2024</a:t>
             </a:fld>
             <a:endParaRPr lang="en-NP"/>
           </a:p>
@@ -3336,7 +4512,7 @@
           <a:p>
             <a:fld id="{A4BF3450-BA41-5048-8667-1F61E2E0538F}" type="datetimeFigureOut">
               <a:rPr lang="en-NP" smtClean="0"/>
-              <a:t>12/04/2024</a:t>
+              <a:t>13/04/2024</a:t>
             </a:fld>
             <a:endParaRPr lang="en-NP"/>
           </a:p>
@@ -3579,7 +4755,7 @@
           <a:p>
             <a:fld id="{A4BF3450-BA41-5048-8667-1F61E2E0538F}" type="datetimeFigureOut">
               <a:rPr lang="en-NP" smtClean="0"/>
-              <a:t>12/04/2024</a:t>
+              <a:t>13/04/2024</a:t>
             </a:fld>
             <a:endParaRPr lang="en-NP"/>
           </a:p>
@@ -4252,14 +5428,14 @@
           </p:nvPr>
         </p:nvPicPr>
         <p:blipFill>
-          <a:blip r:embed="rId2"/>
+          <a:blip r:embed="rId3"/>
           <a:stretch>
             <a:fillRect/>
           </a:stretch>
         </p:blipFill>
         <p:spPr>
           <a:xfrm>
-            <a:off x="3044582" y="1440474"/>
+            <a:off x="1543879" y="1350322"/>
             <a:ext cx="7584536" cy="5417526"/>
           </a:xfrm>
         </p:spPr>
@@ -4307,6 +5483,51 @@
           </a:p>
           <a:p>
             <a:endParaRPr lang="en-NP" sz="1400" dirty="0"/>
+          </a:p>
+        </p:txBody>
+      </p:sp>
+      <p:sp>
+        <p:nvSpPr>
+          <p:cNvPr id="2" name="TextBox 1">
+            <a:extLst>
+              <a:ext uri="{FF2B5EF4-FFF2-40B4-BE49-F238E27FC236}">
+                <a16:creationId xmlns:a16="http://schemas.microsoft.com/office/drawing/2014/main" id="{889F050B-F40B-31BE-99BF-B940C30B5941}"/>
+              </a:ext>
+            </a:extLst>
+          </p:cNvPr>
+          <p:cNvSpPr txBox="1"/>
+          <p:nvPr/>
+        </p:nvSpPr>
+        <p:spPr>
+          <a:xfrm>
+            <a:off x="7505185" y="5629075"/>
+            <a:ext cx="5258872" cy="1138773"/>
+          </a:xfrm>
+          <a:prstGeom prst="rect">
+            <a:avLst/>
+          </a:prstGeom>
+          <a:noFill/>
+        </p:spPr>
+        <p:txBody>
+          <a:bodyPr wrap="square" rtlCol="0">
+            <a:spAutoFit/>
+          </a:bodyPr>
+          <a:lstStyle/>
+          <a:p>
+            <a:pPr algn="l"/>
+            <a:r>
+              <a:rPr lang="en-US" sz="1600" b="1" i="1" dirty="0">
+                <a:effectLst/>
+                <a:latin typeface=""/>
+              </a:rPr>
+              <a:t>Larger businesses more likely to use to use generative AI than smaller ones</a:t>
+            </a:r>
+          </a:p>
+          <a:p>
+            <a:br>
+              <a:rPr lang="en-US" dirty="0"/>
+            </a:br>
+            <a:endParaRPr lang="en-NP" dirty="0"/>
           </a:p>
         </p:txBody>
       </p:sp>
@@ -4372,10 +5593,16 @@
               <a:buNone/>
             </a:pPr>
             <a:r>
+              <a:rPr lang="en-US" sz="2400" b="1" dirty="0">
+                <a:latin typeface=""/>
+              </a:rPr>
+              <a:t>Objective 4</a:t>
+            </a:r>
+            <a:r>
               <a:rPr lang="en-US" sz="2400" dirty="0">
                 <a:latin typeface=""/>
               </a:rPr>
-              <a:t>Objective 4: How much value is created created by using generative AI in top 5 business sectors ? Will generative AI replace jobs by reducing employment?</a:t>
+              <a:t>: How much value is created created by using generative AI in top 5 business sectors ? Will generative AI replace jobs by reducing employment?</a:t>
             </a:r>
           </a:p>
         </p:txBody>
@@ -4397,7 +5624,7 @@
           </p:nvPr>
         </p:nvPicPr>
         <p:blipFill>
-          <a:blip r:embed="rId2"/>
+          <a:blip r:embed="rId3"/>
           <a:stretch>
             <a:fillRect/>
           </a:stretch>
@@ -4409,6 +5636,57 @@
           </a:xfrm>
         </p:spPr>
       </p:pic>
+      <p:sp>
+        <p:nvSpPr>
+          <p:cNvPr id="2" name="TextBox 1">
+            <a:extLst>
+              <a:ext uri="{FF2B5EF4-FFF2-40B4-BE49-F238E27FC236}">
+                <a16:creationId xmlns:a16="http://schemas.microsoft.com/office/drawing/2014/main" id="{C7AE033B-4AE3-29F2-E691-8B6BBF52D14C}"/>
+              </a:ext>
+            </a:extLst>
+          </p:cNvPr>
+          <p:cNvSpPr txBox="1"/>
+          <p:nvPr/>
+        </p:nvSpPr>
+        <p:spPr>
+          <a:xfrm>
+            <a:off x="7011903" y="4675031"/>
+            <a:ext cx="5180097" cy="1200329"/>
+          </a:xfrm>
+          <a:prstGeom prst="rect">
+            <a:avLst/>
+          </a:prstGeom>
+          <a:noFill/>
+        </p:spPr>
+        <p:txBody>
+          <a:bodyPr wrap="square" rtlCol="0">
+            <a:spAutoFit/>
+          </a:bodyPr>
+          <a:lstStyle/>
+          <a:p>
+            <a:r>
+              <a:rPr lang="en-NP" b="1" i="1" dirty="0"/>
+              <a:t>Accelerate t</a:t>
+            </a:r>
+            <a:r>
+              <a:rPr lang="en-US" b="1" i="1" dirty="0"/>
+              <a:t>he</a:t>
+            </a:r>
+            <a:r>
+              <a:rPr lang="en-NP" b="1" i="1" dirty="0"/>
+              <a:t> development of creative content has the </a:t>
+            </a:r>
+            <a:r>
+              <a:rPr lang="en-US" b="1" i="1" dirty="0"/>
+              <a:t>M</a:t>
+            </a:r>
+            <a:r>
+              <a:rPr lang="en-NP" b="1" i="1" dirty="0"/>
+              <a:t>ost value % than Increase in automation in task, withou reducing employment in all the business sectors or characteristics.</a:t>
+            </a:r>
+          </a:p>
+        </p:txBody>
+      </p:sp>
     </p:spTree>
     <p:extLst>
       <p:ext uri="{BB962C8B-B14F-4D97-AF65-F5344CB8AC3E}">
@@ -4471,10 +5749,16 @@
               <a:buNone/>
             </a:pPr>
             <a:r>
+              <a:rPr lang="en-US" sz="2800" b="1" dirty="0">
+                <a:latin typeface=""/>
+              </a:rPr>
+              <a:t>Objective 5:</a:t>
+            </a:r>
+            <a:r>
               <a:rPr lang="en-US" sz="2800" dirty="0">
                 <a:latin typeface=""/>
               </a:rPr>
-              <a:t>Objective 5: What are the top 5 business sectors  in Canada that don't plan to use generative AI, even though it could help them save costs?</a:t>
+              <a:t> What are the top 5 business sectors  in Canada that have not considered to use generative AI, even though it could help them save costs?</a:t>
             </a:r>
             <a:endParaRPr lang="en-NP" sz="2800" dirty="0">
               <a:latin typeface=""/>
@@ -4497,7 +5781,7 @@
           <p:nvPr/>
         </p:nvPicPr>
         <p:blipFill>
-          <a:blip r:embed="rId2"/>
+          <a:blip r:embed="rId3"/>
           <a:stretch>
             <a:fillRect/>
           </a:stretch>
@@ -4571,7 +5855,7 @@
           <a:lstStyle/>
           <a:p>
             <a:r>
-              <a:rPr lang="en-NP" sz="2800" dirty="0"/>
+              <a:rPr lang="en-NP" sz="2800" b="1" dirty="0"/>
               <a:t>Objective 5: </a:t>
             </a:r>
           </a:p>
@@ -4673,14 +5957,14 @@
           <p:nvPr/>
         </p:nvPicPr>
         <p:blipFill>
-          <a:blip r:embed="rId2"/>
+          <a:blip r:embed="rId3"/>
           <a:stretch>
             <a:fillRect/>
           </a:stretch>
         </p:blipFill>
         <p:spPr>
           <a:xfrm>
-            <a:off x="2884964" y="630939"/>
+            <a:off x="1924833" y="787443"/>
             <a:ext cx="7396359" cy="5283114"/>
           </a:xfrm>
           <a:prstGeom prst="rect">
@@ -4702,8 +5986,8 @@
         </p:nvSpPr>
         <p:spPr>
           <a:xfrm>
-            <a:off x="1281681" y="6196119"/>
-            <a:ext cx="11151395" cy="400110"/>
+            <a:off x="753647" y="6196119"/>
+            <a:ext cx="11438353" cy="400110"/>
           </a:xfrm>
           <a:prstGeom prst="rect">
             <a:avLst/>
@@ -4726,7 +6010,56 @@
               <a:rPr lang="en-NP" sz="2000" dirty="0">
                 <a:latin typeface=""/>
               </a:rPr>
-              <a:t>ut they do have some plans to use Generative AI to automate Tasks to replace employees.</a:t>
+              <a:t>ut sadly, they do have some plans to use Generative AI to automate Tasks to replace employees.</a:t>
+            </a:r>
+          </a:p>
+        </p:txBody>
+      </p:sp>
+      <p:sp>
+        <p:nvSpPr>
+          <p:cNvPr id="3" name="TextBox 2">
+            <a:extLst>
+              <a:ext uri="{FF2B5EF4-FFF2-40B4-BE49-F238E27FC236}">
+                <a16:creationId xmlns:a16="http://schemas.microsoft.com/office/drawing/2014/main" id="{B0B96B43-9687-D9B6-92EA-7903BC0C751A}"/>
+              </a:ext>
+            </a:extLst>
+          </p:cNvPr>
+          <p:cNvSpPr txBox="1"/>
+          <p:nvPr/>
+        </p:nvSpPr>
+        <p:spPr>
+          <a:xfrm>
+            <a:off x="6655366" y="4171951"/>
+            <a:ext cx="5451172" cy="646331"/>
+          </a:xfrm>
+          <a:prstGeom prst="rect">
+            <a:avLst/>
+          </a:prstGeom>
+          <a:noFill/>
+        </p:spPr>
+        <p:txBody>
+          <a:bodyPr wrap="none" rtlCol="0">
+            <a:spAutoFit/>
+          </a:bodyPr>
+          <a:lstStyle/>
+          <a:p>
+            <a:r>
+              <a:rPr lang="en-NP" b="1" i="1" dirty="0"/>
+              <a:t>% Potential value  of using Generative AI  Construction </a:t>
+            </a:r>
+          </a:p>
+          <a:p>
+            <a:r>
+              <a:rPr lang="en-NP" b="1" i="1" dirty="0"/>
+              <a:t>business sector </a:t>
+            </a:r>
+            <a:r>
+              <a:rPr lang="en-US" b="1" i="1" dirty="0"/>
+              <a:t>H</a:t>
+            </a:r>
+            <a:r>
+              <a:rPr lang="en-NP" b="1" i="1" dirty="0"/>
+              <a:t>as the highest potiential value</a:t>
             </a:r>
           </a:p>
         </p:txBody>
@@ -4741,6 +6074,84 @@
   <p:clrMapOvr>
     <a:masterClrMapping/>
   </p:clrMapOvr>
+  <p:timing>
+    <p:tnLst>
+      <p:par>
+        <p:cTn id="1" dur="indefinite" restart="never" nodeType="tmRoot">
+          <p:childTnLst>
+            <p:seq concurrent="1" nextAc="seek">
+              <p:cTn id="2" dur="indefinite" nodeType="mainSeq">
+                <p:childTnLst>
+                  <p:par>
+                    <p:cTn id="3" fill="hold">
+                      <p:stCondLst>
+                        <p:cond delay="indefinite"/>
+                      </p:stCondLst>
+                      <p:childTnLst>
+                        <p:par>
+                          <p:cTn id="4" fill="hold">
+                            <p:stCondLst>
+                              <p:cond delay="0"/>
+                            </p:stCondLst>
+                            <p:childTnLst>
+                              <p:par>
+                                <p:cTn id="5" presetID="1" presetClass="entr" presetSubtype="0" fill="hold" grpId="0" nodeType="clickEffect">
+                                  <p:stCondLst>
+                                    <p:cond delay="0"/>
+                                  </p:stCondLst>
+                                  <p:childTnLst>
+                                    <p:set>
+                                      <p:cBhvr>
+                                        <p:cTn id="6" dur="1" fill="hold">
+                                          <p:stCondLst>
+                                            <p:cond delay="0"/>
+                                          </p:stCondLst>
+                                        </p:cTn>
+                                        <p:tgtEl>
+                                          <p:spTgt spid="5"/>
+                                        </p:tgtEl>
+                                        <p:attrNameLst>
+                                          <p:attrName>style.visibility</p:attrName>
+                                        </p:attrNameLst>
+                                      </p:cBhvr>
+                                      <p:to>
+                                        <p:strVal val="visible"/>
+                                      </p:to>
+                                    </p:set>
+                                  </p:childTnLst>
+                                </p:cTn>
+                              </p:par>
+                            </p:childTnLst>
+                          </p:cTn>
+                        </p:par>
+                      </p:childTnLst>
+                    </p:cTn>
+                  </p:par>
+                </p:childTnLst>
+              </p:cTn>
+              <p:prevCondLst>
+                <p:cond evt="onPrev" delay="0">
+                  <p:tgtEl>
+                    <p:sldTgt/>
+                  </p:tgtEl>
+                </p:cond>
+              </p:prevCondLst>
+              <p:nextCondLst>
+                <p:cond evt="onNext" delay="0">
+                  <p:tgtEl>
+                    <p:sldTgt/>
+                  </p:tgtEl>
+                </p:cond>
+              </p:nextCondLst>
+            </p:seq>
+          </p:childTnLst>
+        </p:cTn>
+      </p:par>
+    </p:tnLst>
+    <p:bldLst>
+      <p:bldP spid="5" grpId="0"/>
+    </p:bldLst>
+  </p:timing>
 </p:sld>
 </file>
 
@@ -4813,18 +6224,18 @@
         </p:nvSpPr>
         <p:spPr>
           <a:xfrm>
-            <a:off x="838200" y="1870075"/>
-            <a:ext cx="10515600" cy="4351338"/>
+            <a:off x="709612" y="1498600"/>
+            <a:ext cx="11049000" cy="4351338"/>
           </a:xfrm>
         </p:spPr>
         <p:txBody>
           <a:bodyPr>
-            <a:normAutofit fontScale="92500" lnSpcReduction="10000"/>
+            <a:noAutofit/>
           </a:bodyPr>
           <a:lstStyle/>
           <a:p>
             <a:r>
-              <a:rPr lang="en-US" sz="2000" b="0" i="0" dirty="0">
+              <a:rPr lang="en-US" sz="2400" b="0" i="0" dirty="0">
                 <a:solidFill>
                   <a:srgbClr val="333333"/>
                 </a:solidFill>
@@ -4834,7 +6245,7 @@
               </a:rPr>
               <a:t>Generative AI can be transformative labor- and money-saving technology.</a:t>
             </a:r>
-            <a:endParaRPr lang="en-US" sz="2000" dirty="0">
+            <a:endParaRPr lang="en-US" sz="2400" dirty="0">
               <a:latin typeface=""/>
               <a:cs typeface="Times New Roman" panose="02020603050405020304" pitchFamily="18" charset="0"/>
             </a:endParaRPr>
@@ -4843,14 +6254,14 @@
             <a:pPr marL="0" indent="0">
               <a:buNone/>
             </a:pPr>
-            <a:endParaRPr lang="en-US" sz="2000" dirty="0">
+            <a:endParaRPr lang="en-US" sz="2400" dirty="0">
               <a:latin typeface=""/>
               <a:cs typeface="Times New Roman" panose="02020603050405020304" pitchFamily="18" charset="0"/>
             </a:endParaRPr>
           </a:p>
           <a:p>
             <a:r>
-              <a:rPr lang="en-US" sz="2000" dirty="0">
+              <a:rPr lang="en-US" sz="2400" dirty="0">
                 <a:latin typeface=""/>
                 <a:cs typeface="Times New Roman" panose="02020603050405020304" pitchFamily="18" charset="0"/>
               </a:rPr>
@@ -4858,32 +6269,63 @@
             </a:r>
           </a:p>
           <a:p>
-            <a:endParaRPr lang="en-US" sz="2000" dirty="0">
+            <a:endParaRPr lang="en-US" sz="2400" dirty="0">
               <a:latin typeface=""/>
               <a:cs typeface="Times New Roman" panose="02020603050405020304" pitchFamily="18" charset="0"/>
             </a:endParaRPr>
           </a:p>
           <a:p>
             <a:r>
-              <a:rPr lang="en-US" sz="2000" dirty="0">
+              <a:rPr lang="en-US" sz="2400" dirty="0">
                 <a:latin typeface=""/>
                 <a:cs typeface="Times New Roman" panose="02020603050405020304" pitchFamily="18" charset="0"/>
               </a:rPr>
-              <a:t>Generative AI usage might enhance job roles by automating repetitive tasks, allowing employees to focus on higher-value, creative work.</a:t>
-            </a:r>
+              <a:t>Generative AI usage might enhance job roles by automating repetitive tasks, allowing employees to focus on higher-value, creative work. (</a:t>
+            </a:r>
+            <a:r>
+              <a:rPr lang="en-NP" sz="2000" b="1" dirty="0">
+                <a:solidFill>
+                  <a:srgbClr val="FF0000"/>
+                </a:solidFill>
+              </a:rPr>
+              <a:t>Accelerate t</a:t>
+            </a:r>
+            <a:r>
+              <a:rPr lang="en-US" sz="2000" b="1" dirty="0">
+                <a:solidFill>
+                  <a:srgbClr val="FF0000"/>
+                </a:solidFill>
+              </a:rPr>
+              <a:t>he</a:t>
+            </a:r>
+            <a:r>
+              <a:rPr lang="en-NP" sz="2000" b="1" dirty="0">
+                <a:solidFill>
+                  <a:srgbClr val="FF0000"/>
+                </a:solidFill>
+              </a:rPr>
+              <a:t> development of creative content )</a:t>
+            </a:r>
+            <a:endParaRPr lang="en-US" sz="3200" b="1" dirty="0">
+              <a:solidFill>
+                <a:srgbClr val="FF0000"/>
+              </a:solidFill>
+              <a:latin typeface=""/>
+              <a:cs typeface="Times New Roman" panose="02020603050405020304" pitchFamily="18" charset="0"/>
+            </a:endParaRPr>
           </a:p>
           <a:p>
             <a:pPr marL="0" indent="0">
               <a:buNone/>
             </a:pPr>
-            <a:endParaRPr lang="en-US" sz="2000" dirty="0">
+            <a:endParaRPr lang="en-US" sz="2400" dirty="0">
               <a:latin typeface=""/>
               <a:cs typeface="Times New Roman" panose="02020603050405020304" pitchFamily="18" charset="0"/>
             </a:endParaRPr>
           </a:p>
           <a:p>
             <a:r>
-              <a:rPr lang="en-US" sz="2000" dirty="0">
+              <a:rPr lang="en-US" sz="2400" dirty="0">
                 <a:effectLst/>
                 <a:latin typeface=""/>
                 <a:cs typeface="Times New Roman" panose="02020603050405020304" pitchFamily="18" charset="0"/>
@@ -4892,14 +6334,14 @@
             </a:r>
           </a:p>
           <a:p>
-            <a:endParaRPr lang="en-US" sz="1200" dirty="0">
+            <a:endParaRPr lang="en-US" sz="900" dirty="0">
               <a:effectLst/>
               <a:latin typeface=""/>
               <a:cs typeface="Times New Roman" panose="02020603050405020304" pitchFamily="18" charset="0"/>
             </a:endParaRPr>
           </a:p>
           <a:p>
-            <a:endParaRPr lang="en-US" sz="1200" dirty="0">
+            <a:endParaRPr lang="en-US" sz="900" dirty="0">
               <a:effectLst/>
               <a:latin typeface=""/>
               <a:cs typeface="Times New Roman" panose="02020603050405020304" pitchFamily="18" charset="0"/>
@@ -4909,7 +6351,7 @@
             <a:pPr marL="0" indent="0" algn="l">
               <a:buNone/>
             </a:pPr>
-            <a:endParaRPr lang="en-US" sz="1200" b="0" i="0" dirty="0">
+            <a:endParaRPr lang="en-US" sz="900" b="0" i="0" dirty="0">
               <a:solidFill>
                 <a:srgbClr val="FFFFFF"/>
               </a:solidFill>
@@ -4923,7 +6365,7 @@
               <a:buNone/>
             </a:pPr>
             <a:br>
-              <a:rPr lang="en-US" sz="1200" b="0" i="0" dirty="0">
+              <a:rPr lang="en-US" sz="900" b="0" i="0" dirty="0">
                 <a:solidFill>
                   <a:srgbClr val="FFFFFF"/>
                 </a:solidFill>
@@ -4932,7 +6374,7 @@
                 <a:cs typeface="Times New Roman" panose="02020603050405020304" pitchFamily="18" charset="0"/>
               </a:rPr>
             </a:br>
-            <a:endParaRPr lang="en-US" sz="1200" b="0" i="0" dirty="0">
+            <a:endParaRPr lang="en-US" sz="900" b="0" i="0" dirty="0">
               <a:solidFill>
                 <a:srgbClr val="FFFFFF"/>
               </a:solidFill>
@@ -4953,6 +6395,232 @@
   <p:clrMapOvr>
     <a:masterClrMapping/>
   </p:clrMapOvr>
+  <p:timing>
+    <p:tnLst>
+      <p:par>
+        <p:cTn id="1" dur="indefinite" restart="never" nodeType="tmRoot">
+          <p:childTnLst>
+            <p:seq concurrent="1" nextAc="seek">
+              <p:cTn id="2" dur="indefinite" nodeType="mainSeq">
+                <p:childTnLst>
+                  <p:par>
+                    <p:cTn id="3" fill="hold">
+                      <p:stCondLst>
+                        <p:cond delay="indefinite"/>
+                      </p:stCondLst>
+                      <p:childTnLst>
+                        <p:par>
+                          <p:cTn id="4" fill="hold">
+                            <p:stCondLst>
+                              <p:cond delay="0"/>
+                            </p:stCondLst>
+                            <p:childTnLst>
+                              <p:par>
+                                <p:cTn id="5" presetID="1" presetClass="entr" presetSubtype="0" fill="hold" nodeType="clickEffect">
+                                  <p:stCondLst>
+                                    <p:cond delay="0"/>
+                                  </p:stCondLst>
+                                  <p:childTnLst>
+                                    <p:set>
+                                      <p:cBhvr>
+                                        <p:cTn id="6" dur="1" fill="hold">
+                                          <p:stCondLst>
+                                            <p:cond delay="0"/>
+                                          </p:stCondLst>
+                                        </p:cTn>
+                                        <p:tgtEl>
+                                          <p:spTgt spid="3">
+                                            <p:txEl>
+                                              <p:pRg st="0" end="0"/>
+                                            </p:txEl>
+                                          </p:spTgt>
+                                        </p:tgtEl>
+                                        <p:attrNameLst>
+                                          <p:attrName>style.visibility</p:attrName>
+                                        </p:attrNameLst>
+                                      </p:cBhvr>
+                                      <p:to>
+                                        <p:strVal val="visible"/>
+                                      </p:to>
+                                    </p:set>
+                                  </p:childTnLst>
+                                </p:cTn>
+                              </p:par>
+                            </p:childTnLst>
+                          </p:cTn>
+                        </p:par>
+                      </p:childTnLst>
+                    </p:cTn>
+                  </p:par>
+                  <p:par>
+                    <p:cTn id="7" fill="hold">
+                      <p:stCondLst>
+                        <p:cond delay="indefinite"/>
+                      </p:stCondLst>
+                      <p:childTnLst>
+                        <p:par>
+                          <p:cTn id="8" fill="hold">
+                            <p:stCondLst>
+                              <p:cond delay="0"/>
+                            </p:stCondLst>
+                            <p:childTnLst>
+                              <p:par>
+                                <p:cTn id="9" presetID="1" presetClass="entr" presetSubtype="0" fill="hold" nodeType="clickEffect">
+                                  <p:stCondLst>
+                                    <p:cond delay="0"/>
+                                  </p:stCondLst>
+                                  <p:childTnLst>
+                                    <p:set>
+                                      <p:cBhvr>
+                                        <p:cTn id="10" dur="1" fill="hold">
+                                          <p:stCondLst>
+                                            <p:cond delay="0"/>
+                                          </p:stCondLst>
+                                        </p:cTn>
+                                        <p:tgtEl>
+                                          <p:spTgt spid="3">
+                                            <p:txEl>
+                                              <p:pRg st="2" end="2"/>
+                                            </p:txEl>
+                                          </p:spTgt>
+                                        </p:tgtEl>
+                                        <p:attrNameLst>
+                                          <p:attrName>style.visibility</p:attrName>
+                                        </p:attrNameLst>
+                                      </p:cBhvr>
+                                      <p:to>
+                                        <p:strVal val="visible"/>
+                                      </p:to>
+                                    </p:set>
+                                  </p:childTnLst>
+                                </p:cTn>
+                              </p:par>
+                            </p:childTnLst>
+                          </p:cTn>
+                        </p:par>
+                      </p:childTnLst>
+                    </p:cTn>
+                  </p:par>
+                  <p:par>
+                    <p:cTn id="11" fill="hold">
+                      <p:stCondLst>
+                        <p:cond delay="indefinite"/>
+                      </p:stCondLst>
+                      <p:childTnLst>
+                        <p:par>
+                          <p:cTn id="12" fill="hold">
+                            <p:stCondLst>
+                              <p:cond delay="0"/>
+                            </p:stCondLst>
+                            <p:childTnLst>
+                              <p:par>
+                                <p:cTn id="13" presetID="1" presetClass="entr" presetSubtype="0" fill="hold" nodeType="clickEffect">
+                                  <p:stCondLst>
+                                    <p:cond delay="0"/>
+                                  </p:stCondLst>
+                                  <p:childTnLst>
+                                    <p:set>
+                                      <p:cBhvr>
+                                        <p:cTn id="14" dur="1" fill="hold">
+                                          <p:stCondLst>
+                                            <p:cond delay="0"/>
+                                          </p:stCondLst>
+                                        </p:cTn>
+                                        <p:tgtEl>
+                                          <p:spTgt spid="3">
+                                            <p:txEl>
+                                              <p:pRg st="4" end="4"/>
+                                            </p:txEl>
+                                          </p:spTgt>
+                                        </p:tgtEl>
+                                        <p:attrNameLst>
+                                          <p:attrName>style.visibility</p:attrName>
+                                        </p:attrNameLst>
+                                      </p:cBhvr>
+                                      <p:to>
+                                        <p:strVal val="visible"/>
+                                      </p:to>
+                                    </p:set>
+                                  </p:childTnLst>
+                                </p:cTn>
+                              </p:par>
+                            </p:childTnLst>
+                          </p:cTn>
+                        </p:par>
+                      </p:childTnLst>
+                    </p:cTn>
+                  </p:par>
+                  <p:par>
+                    <p:cTn id="15" fill="hold">
+                      <p:stCondLst>
+                        <p:cond delay="indefinite"/>
+                      </p:stCondLst>
+                      <p:childTnLst>
+                        <p:par>
+                          <p:cTn id="16" fill="hold">
+                            <p:stCondLst>
+                              <p:cond delay="0"/>
+                            </p:stCondLst>
+                            <p:childTnLst>
+                              <p:par>
+                                <p:cTn id="17" presetID="1" presetClass="entr" presetSubtype="0" fill="hold" nodeType="clickEffect">
+                                  <p:stCondLst>
+                                    <p:cond delay="0"/>
+                                  </p:stCondLst>
+                                  <p:childTnLst>
+                                    <p:set>
+                                      <p:cBhvr>
+                                        <p:cTn id="18" dur="1" fill="hold">
+                                          <p:stCondLst>
+                                            <p:cond delay="0"/>
+                                          </p:stCondLst>
+                                        </p:cTn>
+                                        <p:tgtEl>
+                                          <p:spTgt spid="3">
+                                            <p:txEl>
+                                              <p:pRg st="6" end="6"/>
+                                            </p:txEl>
+                                          </p:spTgt>
+                                        </p:tgtEl>
+                                        <p:attrNameLst>
+                                          <p:attrName>style.visibility</p:attrName>
+                                        </p:attrNameLst>
+                                      </p:cBhvr>
+                                      <p:to>
+                                        <p:strVal val="visible"/>
+                                      </p:to>
+                                    </p:set>
+                                  </p:childTnLst>
+                                </p:cTn>
+                              </p:par>
+                            </p:childTnLst>
+                          </p:cTn>
+                        </p:par>
+                      </p:childTnLst>
+                    </p:cTn>
+                  </p:par>
+                </p:childTnLst>
+              </p:cTn>
+              <p:prevCondLst>
+                <p:cond evt="onPrev" delay="0">
+                  <p:tgtEl>
+                    <p:sldTgt/>
+                  </p:tgtEl>
+                </p:cond>
+              </p:prevCondLst>
+              <p:nextCondLst>
+                <p:cond evt="onNext" delay="0">
+                  <p:tgtEl>
+                    <p:sldTgt/>
+                  </p:tgtEl>
+                </p:cond>
+              </p:nextCondLst>
+            </p:seq>
+          </p:childTnLst>
+        </p:cTn>
+      </p:par>
+    </p:tnLst>
+  </p:timing>
 </p:sld>
 </file>
 
@@ -5376,7 +7044,7 @@
               <a:rPr lang="en-US" dirty="0">
                 <a:latin typeface=""/>
               </a:rPr>
-              <a:t>How much value is created created by using generative AI in top 5 business sectors ? Will generative AI replace jobs by reducing employment?</a:t>
+              <a:t>How much value is created by using generative AI in top 5 business sectors ? Will generative AI replace jobs by reducing employment?</a:t>
             </a:r>
           </a:p>
           <a:p>
@@ -5393,8 +7061,16 @@
               <a:rPr lang="en-US" dirty="0">
                 <a:latin typeface=""/>
               </a:rPr>
-              <a:t> What are the top 5 business sectors  in Canada that don't plan to use generative AI, even though it could help them save costs?</a:t>
-            </a:r>
+              <a:t> Objective 5: What are the top 5 business sectors  in Canada that have not considered to use generative AI, even though it could help them save costs?</a:t>
+            </a:r>
+            <a:endParaRPr lang="en-NP" dirty="0">
+              <a:latin typeface=""/>
+            </a:endParaRPr>
+          </a:p>
+          <a:p>
+            <a:pPr marL="0" indent="0">
+              <a:buNone/>
+            </a:pPr>
             <a:endParaRPr lang="en-NP" dirty="0">
               <a:latin typeface=""/>
             </a:endParaRPr>
@@ -5852,14 +7528,14 @@
           <p:nvPr/>
         </p:nvPicPr>
         <p:blipFill>
-          <a:blip r:embed="rId2"/>
+          <a:blip r:embed="rId3"/>
           <a:stretch>
             <a:fillRect/>
           </a:stretch>
         </p:blipFill>
         <p:spPr>
           <a:xfrm>
-            <a:off x="570998" y="2657981"/>
+            <a:off x="570998" y="2686557"/>
             <a:ext cx="11050004" cy="2930971"/>
           </a:xfrm>
           <a:prstGeom prst="rect">
@@ -5881,8 +7557,8 @@
         </p:nvSpPr>
         <p:spPr>
           <a:xfrm>
-            <a:off x="5141693" y="5763191"/>
-            <a:ext cx="3255332" cy="923330"/>
+            <a:off x="4597757" y="5657671"/>
+            <a:ext cx="3837904" cy="1200329"/>
           </a:xfrm>
           <a:prstGeom prst="rect">
             <a:avLst/>
@@ -5937,6 +7613,14 @@
                 <a:latin typeface=""/>
               </a:rPr>
               <a:t>COORDINATE</a:t>
+            </a:r>
+          </a:p>
+          <a:p>
+            <a:r>
+              <a:rPr lang="en-NP" b="1" dirty="0">
+                <a:latin typeface=""/>
+              </a:rPr>
+              <a:t>Categorical and numerical data </a:t>
             </a:r>
           </a:p>
         </p:txBody>
@@ -6252,7 +7936,7 @@
           <p:nvPr/>
         </p:nvPicPr>
         <p:blipFill>
-          <a:blip r:embed="rId2"/>
+          <a:blip r:embed="rId3"/>
           <a:stretch>
             <a:fillRect/>
           </a:stretch>
@@ -6281,8 +7965,8 @@
         </p:nvSpPr>
         <p:spPr>
           <a:xfrm>
-            <a:off x="4761186" y="5716159"/>
-            <a:ext cx="6096000" cy="923330"/>
+            <a:off x="4439215" y="5587371"/>
+            <a:ext cx="6096000" cy="1477328"/>
           </a:xfrm>
           <a:prstGeom prst="rect">
             <a:avLst/>
@@ -6338,6 +8022,19 @@
               </a:rPr>
               <a:t>COORDINATE</a:t>
             </a:r>
+          </a:p>
+          <a:p>
+            <a:r>
+              <a:rPr lang="en-NP" b="1" dirty="0">
+                <a:latin typeface=""/>
+              </a:rPr>
+              <a:t>Categorical and numerical data </a:t>
+            </a:r>
+          </a:p>
+          <a:p>
+            <a:endParaRPr lang="en-NP" dirty="0">
+              <a:latin typeface=""/>
+            </a:endParaRPr>
           </a:p>
         </p:txBody>
       </p:sp>
@@ -6621,7 +8318,7 @@
               <a:rPr lang="en-US" sz="2400" dirty="0">
                 <a:latin typeface=""/>
               </a:rPr>
-              <a:t> API) for data processing (data  loading ,cleaning and transformations)</a:t>
+              <a:t> API) for data processing (data loading ,cleaning and transformations)</a:t>
             </a:r>
           </a:p>
           <a:p>
@@ -6684,7 +8381,7 @@
             <a:r>
               <a:rPr lang="en-US" sz="2400" dirty="0">
                 <a:latin typeface=""/>
-                <a:hlinkClick r:id="rId2"/>
+                <a:hlinkClick r:id="rId3"/>
               </a:rPr>
               <a:t>https://github.com/rajprasadshrestha/groupassignments/tree/main/bigdatafundamentals</a:t>
             </a:r>
@@ -7121,7 +8818,7 @@
                 <a:latin typeface=""/>
                 <a:cs typeface="Times New Roman" panose="02020603050405020304" pitchFamily="18" charset="0"/>
               </a:rPr>
-              <a:t>Data Cleaning:</a:t>
+              <a:t>Data Cleaning :</a:t>
             </a:r>
           </a:p>
           <a:p>
@@ -7145,7 +8842,24 @@
                 <a:latin typeface=""/>
                 <a:cs typeface="Times New Roman" panose="02020603050405020304" pitchFamily="18" charset="0"/>
               </a:rPr>
-              <a:t>2. Checked for and replaced all blanks and NULL values in each column with 0.</a:t>
+              <a:t>2. Checked for and replaced all blanks and NULL values in </a:t>
+            </a:r>
+            <a:r>
+              <a:rPr lang="en-US" dirty="0">
+                <a:solidFill>
+                  <a:srgbClr val="FF0000"/>
+                </a:solidFill>
+                <a:latin typeface=""/>
+                <a:cs typeface="Times New Roman" panose="02020603050405020304" pitchFamily="18" charset="0"/>
+              </a:rPr>
+              <a:t>VALUE</a:t>
+            </a:r>
+            <a:r>
+              <a:rPr lang="en-US" dirty="0">
+                <a:latin typeface=""/>
+                <a:cs typeface="Times New Roman" panose="02020603050405020304" pitchFamily="18" charset="0"/>
+              </a:rPr>
+              <a:t> column with 0 .</a:t>
             </a:r>
           </a:p>
           <a:p>
@@ -7318,39 +9032,26 @@
                                   </p:childTnLst>
                                 </p:cTn>
                               </p:par>
+                            </p:childTnLst>
+                          </p:cTn>
+                        </p:par>
+                      </p:childTnLst>
+                    </p:cTn>
+                  </p:par>
+                  <p:par>
+                    <p:cTn id="9" fill="hold">
+                      <p:stCondLst>
+                        <p:cond delay="indefinite"/>
+                      </p:stCondLst>
+                      <p:childTnLst>
+                        <p:par>
+                          <p:cTn id="10" fill="hold">
+                            <p:stCondLst>
+                              <p:cond delay="0"/>
+                            </p:stCondLst>
+                            <p:childTnLst>
                               <p:par>
-                                <p:cTn id="9" presetID="1" presetClass="entr" presetSubtype="0" fill="hold" nodeType="withEffect">
-                                  <p:stCondLst>
-                                    <p:cond delay="0"/>
-                                  </p:stCondLst>
-                                  <p:childTnLst>
-                                    <p:set>
-                                      <p:cBhvr>
-                                        <p:cTn id="10" dur="1" fill="hold">
-                                          <p:stCondLst>
-                                            <p:cond delay="0"/>
-                                          </p:stCondLst>
-                                        </p:cTn>
-                                        <p:tgtEl>
-                                          <p:spTgt spid="5">
-                                            <p:txEl>
-                                              <p:pRg st="3" end="3"/>
-                                            </p:txEl>
-                                          </p:spTgt>
-                                        </p:tgtEl>
-                                        <p:attrNameLst>
-                                          <p:attrName>style.visibility</p:attrName>
-                                        </p:attrNameLst>
-                                      </p:cBhvr>
-                                      <p:to>
-                                        <p:strVal val="visible"/>
-                                      </p:to>
-                                    </p:set>
-                                  </p:childTnLst>
-                                </p:cTn>
-                              </p:par>
-                              <p:par>
-                                <p:cTn id="11" presetID="1" presetClass="entr" presetSubtype="0" fill="hold" nodeType="withEffect">
+                                <p:cTn id="11" presetID="1" presetClass="entr" presetSubtype="0" fill="hold" nodeType="clickEffect">
                                   <p:stCondLst>
                                     <p:cond delay="0"/>
                                   </p:stCondLst>
@@ -7365,7 +9066,7 @@
                                         <p:tgtEl>
                                           <p:spTgt spid="5">
                                             <p:txEl>
-                                              <p:pRg st="5" end="5"/>
+                                              <p:pRg st="3" end="3"/>
                                             </p:txEl>
                                           </p:spTgt>
                                         </p:tgtEl>
@@ -7414,6 +9115,55 @@
                                         <p:tgtEl>
                                           <p:spTgt spid="5">
                                             <p:txEl>
+                                              <p:pRg st="5" end="5"/>
+                                            </p:txEl>
+                                          </p:spTgt>
+                                        </p:tgtEl>
+                                        <p:attrNameLst>
+                                          <p:attrName>style.visibility</p:attrName>
+                                        </p:attrNameLst>
+                                      </p:cBhvr>
+                                      <p:to>
+                                        <p:strVal val="visible"/>
+                                      </p:to>
+                                    </p:set>
+                                  </p:childTnLst>
+                                </p:cTn>
+                              </p:par>
+                            </p:childTnLst>
+                          </p:cTn>
+                        </p:par>
+                      </p:childTnLst>
+                    </p:cTn>
+                  </p:par>
+                  <p:par>
+                    <p:cTn id="17" fill="hold">
+                      <p:stCondLst>
+                        <p:cond delay="indefinite"/>
+                      </p:stCondLst>
+                      <p:childTnLst>
+                        <p:par>
+                          <p:cTn id="18" fill="hold">
+                            <p:stCondLst>
+                              <p:cond delay="0"/>
+                            </p:stCondLst>
+                            <p:childTnLst>
+                              <p:par>
+                                <p:cTn id="19" presetID="1" presetClass="entr" presetSubtype="0" fill="hold" nodeType="clickEffect">
+                                  <p:stCondLst>
+                                    <p:cond delay="0"/>
+                                  </p:stCondLst>
+                                  <p:childTnLst>
+                                    <p:set>
+                                      <p:cBhvr>
+                                        <p:cTn id="20" dur="1" fill="hold">
+                                          <p:stCondLst>
+                                            <p:cond delay="0"/>
+                                          </p:stCondLst>
+                                        </p:cTn>
+                                        <p:tgtEl>
+                                          <p:spTgt spid="5">
+                                            <p:txEl>
                                               <p:pRg st="7" end="7"/>
                                             </p:txEl>
                                           </p:spTgt>
@@ -7430,14 +9180,14 @@
                                 </p:cTn>
                               </p:par>
                               <p:par>
-                                <p:cTn id="17" presetID="1" presetClass="entr" presetSubtype="0" fill="hold" nodeType="withEffect">
+                                <p:cTn id="21" presetID="1" presetClass="entr" presetSubtype="0" fill="hold" nodeType="withEffect">
                                   <p:stCondLst>
                                     <p:cond delay="0"/>
                                   </p:stCondLst>
                                   <p:childTnLst>
                                     <p:set>
                                       <p:cBhvr>
-                                        <p:cTn id="18" dur="1" fill="hold">
+                                        <p:cTn id="22" dur="1" fill="hold">
                                           <p:stCondLst>
                                             <p:cond delay="0"/>
                                           </p:stCondLst>
@@ -7460,15 +9210,33 @@
                                   </p:childTnLst>
                                 </p:cTn>
                               </p:par>
+                            </p:childTnLst>
+                          </p:cTn>
+                        </p:par>
+                      </p:childTnLst>
+                    </p:cTn>
+                  </p:par>
+                  <p:par>
+                    <p:cTn id="23" fill="hold">
+                      <p:stCondLst>
+                        <p:cond delay="indefinite"/>
+                      </p:stCondLst>
+                      <p:childTnLst>
+                        <p:par>
+                          <p:cTn id="24" fill="hold">
+                            <p:stCondLst>
+                              <p:cond delay="0"/>
+                            </p:stCondLst>
+                            <p:childTnLst>
                               <p:par>
-                                <p:cTn id="19" presetID="1" presetClass="entr" presetSubtype="0" fill="hold" nodeType="withEffect">
+                                <p:cTn id="25" presetID="1" presetClass="entr" presetSubtype="0" fill="hold" nodeType="clickEffect">
                                   <p:stCondLst>
                                     <p:cond delay="0"/>
                                   </p:stCondLst>
                                   <p:childTnLst>
                                     <p:set>
                                       <p:cBhvr>
-                                        <p:cTn id="20" dur="1" fill="hold">
+                                        <p:cTn id="26" dur="1" fill="hold">
                                           <p:stCondLst>
                                             <p:cond delay="0"/>
                                           </p:stCondLst>
@@ -7665,7 +9433,7 @@
           <p:nvPr/>
         </p:nvPicPr>
         <p:blipFill>
-          <a:blip r:embed="rId2"/>
+          <a:blip r:embed="rId3"/>
           <a:stretch>
             <a:fillRect/>
           </a:stretch>
@@ -7690,6 +9458,84 @@
   <p:clrMapOvr>
     <a:masterClrMapping/>
   </p:clrMapOvr>
+  <p:timing>
+    <p:tnLst>
+      <p:par>
+        <p:cTn id="1" dur="indefinite" restart="never" nodeType="tmRoot">
+          <p:childTnLst>
+            <p:seq concurrent="1" nextAc="seek">
+              <p:cTn id="2" dur="indefinite" nodeType="mainSeq">
+                <p:childTnLst>
+                  <p:par>
+                    <p:cTn id="3" fill="hold">
+                      <p:stCondLst>
+                        <p:cond delay="indefinite"/>
+                      </p:stCondLst>
+                      <p:childTnLst>
+                        <p:par>
+                          <p:cTn id="4" fill="hold">
+                            <p:stCondLst>
+                              <p:cond delay="0"/>
+                            </p:stCondLst>
+                            <p:childTnLst>
+                              <p:par>
+                                <p:cTn id="5" presetID="1" presetClass="entr" presetSubtype="0" fill="hold" grpId="0" nodeType="clickEffect">
+                                  <p:stCondLst>
+                                    <p:cond delay="0"/>
+                                  </p:stCondLst>
+                                  <p:childTnLst>
+                                    <p:set>
+                                      <p:cBhvr>
+                                        <p:cTn id="6" dur="1" fill="hold">
+                                          <p:stCondLst>
+                                            <p:cond delay="0"/>
+                                          </p:stCondLst>
+                                        </p:cTn>
+                                        <p:tgtEl>
+                                          <p:spTgt spid="4"/>
+                                        </p:tgtEl>
+                                        <p:attrNameLst>
+                                          <p:attrName>style.visibility</p:attrName>
+                                        </p:attrNameLst>
+                                      </p:cBhvr>
+                                      <p:to>
+                                        <p:strVal val="visible"/>
+                                      </p:to>
+                                    </p:set>
+                                  </p:childTnLst>
+                                </p:cTn>
+                              </p:par>
+                            </p:childTnLst>
+                          </p:cTn>
+                        </p:par>
+                      </p:childTnLst>
+                    </p:cTn>
+                  </p:par>
+                </p:childTnLst>
+              </p:cTn>
+              <p:prevCondLst>
+                <p:cond evt="onPrev" delay="0">
+                  <p:tgtEl>
+                    <p:sldTgt/>
+                  </p:tgtEl>
+                </p:cond>
+              </p:prevCondLst>
+              <p:nextCondLst>
+                <p:cond evt="onNext" delay="0">
+                  <p:tgtEl>
+                    <p:sldTgt/>
+                  </p:tgtEl>
+                </p:cond>
+              </p:nextCondLst>
+            </p:seq>
+          </p:childTnLst>
+        </p:cTn>
+      </p:par>
+    </p:tnLst>
+    <p:bldLst>
+      <p:bldP spid="4" grpId="0"/>
+    </p:bldLst>
+  </p:timing>
 </p:sld>
 </file>
 

</xml_diff>